<commit_message>
New pictures, minor content fixes
</commit_message>
<xml_diff>
--- a/images/procedure1.pptx
+++ b/images/procedure1.pptx
@@ -259,7 +259,7 @@
           <a:p>
             <a:fld id="{D12CECE7-E485-8341-8DE4-4859C7E44F28}" type="datetimeFigureOut">
               <a:rPr lang="en-US" smtClean="0"/>
-              <a:t>3/13/24</a:t>
+              <a:t>3/17/24</a:t>
             </a:fld>
             <a:endParaRPr lang="en-US"/>
           </a:p>
@@ -457,7 +457,7 @@
           <a:p>
             <a:fld id="{D12CECE7-E485-8341-8DE4-4859C7E44F28}" type="datetimeFigureOut">
               <a:rPr lang="en-US" smtClean="0"/>
-              <a:t>3/13/24</a:t>
+              <a:t>3/17/24</a:t>
             </a:fld>
             <a:endParaRPr lang="en-US"/>
           </a:p>
@@ -665,7 +665,7 @@
           <a:p>
             <a:fld id="{D12CECE7-E485-8341-8DE4-4859C7E44F28}" type="datetimeFigureOut">
               <a:rPr lang="en-US" smtClean="0"/>
-              <a:t>3/13/24</a:t>
+              <a:t>3/17/24</a:t>
             </a:fld>
             <a:endParaRPr lang="en-US"/>
           </a:p>
@@ -863,7 +863,7 @@
           <a:p>
             <a:fld id="{D12CECE7-E485-8341-8DE4-4859C7E44F28}" type="datetimeFigureOut">
               <a:rPr lang="en-US" smtClean="0"/>
-              <a:t>3/13/24</a:t>
+              <a:t>3/17/24</a:t>
             </a:fld>
             <a:endParaRPr lang="en-US"/>
           </a:p>
@@ -1138,7 +1138,7 @@
           <a:p>
             <a:fld id="{D12CECE7-E485-8341-8DE4-4859C7E44F28}" type="datetimeFigureOut">
               <a:rPr lang="en-US" smtClean="0"/>
-              <a:t>3/13/24</a:t>
+              <a:t>3/17/24</a:t>
             </a:fld>
             <a:endParaRPr lang="en-US"/>
           </a:p>
@@ -1403,7 +1403,7 @@
           <a:p>
             <a:fld id="{D12CECE7-E485-8341-8DE4-4859C7E44F28}" type="datetimeFigureOut">
               <a:rPr lang="en-US" smtClean="0"/>
-              <a:t>3/13/24</a:t>
+              <a:t>3/17/24</a:t>
             </a:fld>
             <a:endParaRPr lang="en-US"/>
           </a:p>
@@ -1815,7 +1815,7 @@
           <a:p>
             <a:fld id="{D12CECE7-E485-8341-8DE4-4859C7E44F28}" type="datetimeFigureOut">
               <a:rPr lang="en-US" smtClean="0"/>
-              <a:t>3/13/24</a:t>
+              <a:t>3/17/24</a:t>
             </a:fld>
             <a:endParaRPr lang="en-US"/>
           </a:p>
@@ -1956,7 +1956,7 @@
           <a:p>
             <a:fld id="{D12CECE7-E485-8341-8DE4-4859C7E44F28}" type="datetimeFigureOut">
               <a:rPr lang="en-US" smtClean="0"/>
-              <a:t>3/13/24</a:t>
+              <a:t>3/17/24</a:t>
             </a:fld>
             <a:endParaRPr lang="en-US"/>
           </a:p>
@@ -2069,7 +2069,7 @@
           <a:p>
             <a:fld id="{D12CECE7-E485-8341-8DE4-4859C7E44F28}" type="datetimeFigureOut">
               <a:rPr lang="en-US" smtClean="0"/>
-              <a:t>3/13/24</a:t>
+              <a:t>3/17/24</a:t>
             </a:fld>
             <a:endParaRPr lang="en-US"/>
           </a:p>
@@ -2380,7 +2380,7 @@
           <a:p>
             <a:fld id="{D12CECE7-E485-8341-8DE4-4859C7E44F28}" type="datetimeFigureOut">
               <a:rPr lang="en-US" smtClean="0"/>
-              <a:t>3/13/24</a:t>
+              <a:t>3/17/24</a:t>
             </a:fld>
             <a:endParaRPr lang="en-US"/>
           </a:p>
@@ -2668,7 +2668,7 @@
           <a:p>
             <a:fld id="{D12CECE7-E485-8341-8DE4-4859C7E44F28}" type="datetimeFigureOut">
               <a:rPr lang="en-US" smtClean="0"/>
-              <a:t>3/13/24</a:t>
+              <a:t>3/17/24</a:t>
             </a:fld>
             <a:endParaRPr lang="en-US"/>
           </a:p>
@@ -2909,7 +2909,7 @@
           <a:p>
             <a:fld id="{D12CECE7-E485-8341-8DE4-4859C7E44F28}" type="datetimeFigureOut">
               <a:rPr lang="en-US" smtClean="0"/>
-              <a:t>3/13/24</a:t>
+              <a:t>3/17/24</a:t>
             </a:fld>
             <a:endParaRPr lang="en-US"/>
           </a:p>
@@ -3328,10 +3328,10 @@
       </p:grpSpPr>
       <p:grpSp>
         <p:nvGrpSpPr>
-          <p:cNvPr id="25" name="Group 24">
-            <a:extLst>
-              <a:ext uri="{FF2B5EF4-FFF2-40B4-BE49-F238E27FC236}">
-                <a16:creationId xmlns:a16="http://schemas.microsoft.com/office/drawing/2014/main" id="{9C8D8BFC-8356-8CF8-B894-C73B6DF21973}"/>
+          <p:cNvPr id="38" name="Group 37">
+            <a:extLst>
+              <a:ext uri="{FF2B5EF4-FFF2-40B4-BE49-F238E27FC236}">
+                <a16:creationId xmlns:a16="http://schemas.microsoft.com/office/drawing/2014/main" id="{804E84A1-F549-382A-6B10-4F4B664A9687}"/>
               </a:ext>
             </a:extLst>
           </p:cNvPr>
@@ -3340,10 +3340,10 @@
         </p:nvGrpSpPr>
         <p:grpSpPr>
           <a:xfrm>
-            <a:off x="1135621" y="516708"/>
-            <a:ext cx="6143799" cy="2250787"/>
-            <a:chOff x="1135621" y="516708"/>
-            <a:chExt cx="6143799" cy="2250787"/>
+            <a:off x="2455935" y="1540753"/>
+            <a:ext cx="7187364" cy="3301765"/>
+            <a:chOff x="2251463" y="1540753"/>
+            <a:chExt cx="7187364" cy="3301765"/>
           </a:xfrm>
         </p:grpSpPr>
         <p:grpSp>
@@ -3360,15 +3360,15 @@
           </p:nvGrpSpPr>
           <p:grpSpPr>
             <a:xfrm>
-              <a:off x="1135621" y="516708"/>
-              <a:ext cx="3315273" cy="2250787"/>
-              <a:chOff x="1135621" y="516708"/>
-              <a:chExt cx="3315273" cy="2250787"/>
+              <a:off x="2251463" y="1540753"/>
+              <a:ext cx="3145411" cy="3301765"/>
+              <a:chOff x="1217175" y="-210899"/>
+              <a:chExt cx="3145411" cy="3301765"/>
             </a:xfrm>
           </p:grpSpPr>
           <p:pic>
             <p:nvPicPr>
-              <p:cNvPr id="5" name="Graphic 4" descr="Scientist female with solid fill">
+              <p:cNvPr id="5" name="Graphic 4">
                 <a:extLst>
                   <a:ext uri="{FF2B5EF4-FFF2-40B4-BE49-F238E27FC236}">
                     <a16:creationId xmlns:a16="http://schemas.microsoft.com/office/drawing/2014/main" id="{3D75D7AA-6329-1599-E71B-7E795A9B65BB}"/>
@@ -3381,21 +3381,14 @@
               <p:nvPr/>
             </p:nvPicPr>
             <p:blipFill>
-              <a:blip r:embed="rId2">
-                <a:extLst>
-                  <a:ext uri="{96DAC541-7B7A-43D3-8B79-37D633B846F1}">
-                    <asvg:svgBlip xmlns:asvg="http://schemas.microsoft.com/office/drawing/2016/SVG/main" r:embed="rId3"/>
-                  </a:ext>
-                </a:extLst>
-              </a:blip>
-              <a:stretch>
-                <a:fillRect/>
-              </a:stretch>
+              <a:blip r:embed="rId2"/>
+              <a:srcRect/>
+              <a:stretch/>
             </p:blipFill>
             <p:spPr>
               <a:xfrm>
-                <a:off x="1806925" y="1638104"/>
-                <a:ext cx="1129391" cy="1129391"/>
+                <a:off x="1217175" y="563666"/>
+                <a:ext cx="1677140" cy="2527200"/>
               </a:xfrm>
               <a:prstGeom prst="rect">
                 <a:avLst/>
@@ -3416,13 +3409,13 @@
             </p:nvSpPr>
             <p:spPr>
               <a:xfrm>
-                <a:off x="1135621" y="516708"/>
-                <a:ext cx="1236000" cy="876695"/>
+                <a:off x="1561517" y="-210899"/>
+                <a:ext cx="1277780" cy="917936"/>
               </a:xfrm>
               <a:prstGeom prst="wedgeRoundRectCallout">
                 <a:avLst>
-                  <a:gd name="adj1" fmla="val 30437"/>
-                  <a:gd name="adj2" fmla="val 99851"/>
+                  <a:gd name="adj1" fmla="val 4518"/>
+                  <a:gd name="adj2" fmla="val 88720"/>
                   <a:gd name="adj3" fmla="val 16667"/>
                 </a:avLst>
               </a:prstGeom>
@@ -3493,13 +3486,13 @@
             </p:nvSpPr>
             <p:spPr>
               <a:xfrm>
-                <a:off x="2531516" y="569706"/>
-                <a:ext cx="1236000" cy="823697"/>
+                <a:off x="2968340" y="363680"/>
+                <a:ext cx="1236000" cy="917936"/>
               </a:xfrm>
               <a:prstGeom prst="wedgeRoundRectCallout">
                 <a:avLst>
-                  <a:gd name="adj1" fmla="val -46542"/>
-                  <a:gd name="adj2" fmla="val 87487"/>
+                  <a:gd name="adj1" fmla="val -68837"/>
+                  <a:gd name="adj2" fmla="val 67718"/>
                   <a:gd name="adj3" fmla="val 16667"/>
                 </a:avLst>
               </a:prstGeom>
@@ -3570,8 +3563,8 @@
             </p:nvSpPr>
             <p:spPr>
               <a:xfrm>
-                <a:off x="3092230" y="1510772"/>
-                <a:ext cx="1358664" cy="1129391"/>
+                <a:off x="3003922" y="1450892"/>
+                <a:ext cx="1358664" cy="1177957"/>
               </a:xfrm>
               <a:prstGeom prst="wedgeRoundRectCallout">
                 <a:avLst>
@@ -3648,10 +3641,10 @@
           </p:nvGrpSpPr>
           <p:grpSpPr>
             <a:xfrm>
-              <a:off x="5282094" y="569706"/>
-              <a:ext cx="1997326" cy="2070457"/>
+              <a:off x="7458253" y="2386327"/>
+              <a:ext cx="1980574" cy="2139823"/>
               <a:chOff x="5282094" y="569706"/>
-              <a:chExt cx="1997326" cy="2070457"/>
+              <a:chExt cx="1980574" cy="2139823"/>
             </a:xfrm>
           </p:grpSpPr>
           <p:sp>
@@ -3833,7 +3826,7 @@
           </p:sp>
           <p:pic>
             <p:nvPicPr>
-              <p:cNvPr id="18" name="Graphic 17" descr="School boy with solid fill">
+              <p:cNvPr id="18" name="Graphic 17">
                 <a:extLst>
                   <a:ext uri="{FF2B5EF4-FFF2-40B4-BE49-F238E27FC236}">
                     <a16:creationId xmlns:a16="http://schemas.microsoft.com/office/drawing/2014/main" id="{0C34915B-51CF-79A8-0EBF-3979E1635428}"/>
@@ -3846,21 +3839,14 @@
               <p:nvPr/>
             </p:nvPicPr>
             <p:blipFill>
-              <a:blip r:embed="rId4">
-                <a:extLst>
-                  <a:ext uri="{96DAC541-7B7A-43D3-8B79-37D633B846F1}">
-                    <asvg:svgBlip xmlns:asvg="http://schemas.microsoft.com/office/drawing/2016/SVG/main" r:embed="rId5"/>
-                  </a:ext>
-                </a:extLst>
-              </a:blip>
-              <a:stretch>
-                <a:fillRect/>
-              </a:stretch>
+              <a:blip r:embed="rId3"/>
+              <a:srcRect/>
+              <a:stretch/>
             </p:blipFill>
             <p:spPr>
               <a:xfrm>
-                <a:off x="6150029" y="1180081"/>
-                <a:ext cx="1129391" cy="1129391"/>
+                <a:off x="6071123" y="1046329"/>
+                <a:ext cx="1191545" cy="1663200"/>
               </a:xfrm>
               <a:prstGeom prst="rect">
                 <a:avLst/>
@@ -3868,6 +3854,144 @@
             </p:spPr>
           </p:pic>
         </p:grpSp>
+        <p:pic>
+          <p:nvPicPr>
+            <p:cNvPr id="3" name="Graphic 2" descr="Stopwatch with solid fill">
+              <a:extLst>
+                <a:ext uri="{FF2B5EF4-FFF2-40B4-BE49-F238E27FC236}">
+                  <a16:creationId xmlns:a16="http://schemas.microsoft.com/office/drawing/2014/main" id="{573812E7-E914-ECBB-127D-094287A37EB6}"/>
+                </a:ext>
+              </a:extLst>
+            </p:cNvPr>
+            <p:cNvPicPr>
+              <a:picLocks noChangeAspect="1"/>
+            </p:cNvPicPr>
+            <p:nvPr/>
+          </p:nvPicPr>
+          <p:blipFill>
+            <a:blip r:embed="rId4">
+              <a:extLst>
+                <a:ext uri="{96DAC541-7B7A-43D3-8B79-37D633B846F1}">
+                  <asvg:svgBlip xmlns:asvg="http://schemas.microsoft.com/office/drawing/2016/SVG/main" r:embed="rId5"/>
+                </a:ext>
+              </a:extLst>
+            </a:blip>
+            <a:stretch>
+              <a:fillRect/>
+            </a:stretch>
+          </p:blipFill>
+          <p:spPr>
+            <a:xfrm>
+              <a:off x="6020610" y="2372009"/>
+              <a:ext cx="813906" cy="813906"/>
+            </a:xfrm>
+            <a:prstGeom prst="rect">
+              <a:avLst/>
+            </a:prstGeom>
+          </p:spPr>
+        </p:pic>
+        <p:sp>
+          <p:nvSpPr>
+            <p:cNvPr id="4" name="Rounded Rectangle 3">
+              <a:extLst>
+                <a:ext uri="{FF2B5EF4-FFF2-40B4-BE49-F238E27FC236}">
+                  <a16:creationId xmlns:a16="http://schemas.microsoft.com/office/drawing/2014/main" id="{E49E72C6-17A3-A344-06C3-BB04B07D459D}"/>
+                </a:ext>
+              </a:extLst>
+            </p:cNvPr>
+            <p:cNvSpPr/>
+            <p:nvPr/>
+          </p:nvSpPr>
+          <p:spPr>
+            <a:xfrm>
+              <a:off x="5782940" y="3235566"/>
+              <a:ext cx="1289247" cy="555956"/>
+            </a:xfrm>
+            <a:prstGeom prst="roundRect">
+              <a:avLst/>
+            </a:prstGeom>
+            <a:solidFill>
+              <a:schemeClr val="tx1"/>
+            </a:solidFill>
+            <a:ln>
+              <a:solidFill>
+                <a:schemeClr val="tx1"/>
+              </a:solidFill>
+            </a:ln>
+          </p:spPr>
+          <p:style>
+            <a:lnRef idx="2">
+              <a:schemeClr val="accent1">
+                <a:shade val="15000"/>
+              </a:schemeClr>
+            </a:lnRef>
+            <a:fillRef idx="1">
+              <a:schemeClr val="accent1"/>
+            </a:fillRef>
+            <a:effectRef idx="0">
+              <a:schemeClr val="accent1"/>
+            </a:effectRef>
+            <a:fontRef idx="minor">
+              <a:schemeClr val="lt1"/>
+            </a:fontRef>
+          </p:style>
+          <p:txBody>
+            <a:bodyPr rtlCol="0" anchor="ctr"/>
+            <a:lstStyle/>
+            <a:p>
+              <a:pPr algn="ctr"/>
+              <a:r>
+                <a:rPr lang="en-US" dirty="0"/>
+                <a:t>Response time (RT)</a:t>
+              </a:r>
+            </a:p>
+          </p:txBody>
+        </p:sp>
+        <p:cxnSp>
+          <p:nvCxnSpPr>
+            <p:cNvPr id="7" name="Straight Arrow Connector 6">
+              <a:extLst>
+                <a:ext uri="{FF2B5EF4-FFF2-40B4-BE49-F238E27FC236}">
+                  <a16:creationId xmlns:a16="http://schemas.microsoft.com/office/drawing/2014/main" id="{40565C05-49C0-FE12-C1B4-D9EF1D7FF220}"/>
+                </a:ext>
+              </a:extLst>
+            </p:cNvPr>
+            <p:cNvCxnSpPr>
+              <a:cxnSpLocks/>
+            </p:cNvCxnSpPr>
+            <p:nvPr/>
+          </p:nvCxnSpPr>
+          <p:spPr>
+            <a:xfrm>
+              <a:off x="5783387" y="2243110"/>
+              <a:ext cx="1288800" cy="0"/>
+            </a:xfrm>
+            <a:prstGeom prst="straightConnector1">
+              <a:avLst/>
+            </a:prstGeom>
+            <a:ln w="38100">
+              <a:solidFill>
+                <a:schemeClr val="tx1"/>
+              </a:solidFill>
+              <a:headEnd type="triangle"/>
+              <a:tailEnd type="triangle"/>
+            </a:ln>
+          </p:spPr>
+          <p:style>
+            <a:lnRef idx="2">
+              <a:schemeClr val="accent1"/>
+            </a:lnRef>
+            <a:fillRef idx="0">
+              <a:schemeClr val="accent1"/>
+            </a:fillRef>
+            <a:effectRef idx="1">
+              <a:schemeClr val="accent1"/>
+            </a:effectRef>
+            <a:fontRef idx="minor">
+              <a:schemeClr val="tx1"/>
+            </a:fontRef>
+          </p:style>
+        </p:cxnSp>
       </p:grpSp>
     </p:spTree>
     <p:extLst>

</xml_diff>

<commit_message>
New images, cut intro bullet point
</commit_message>
<xml_diff>
--- a/images/procedure1.pptx
+++ b/images/procedure1.pptx
@@ -3335,13 +3335,15 @@
               </a:ext>
             </a:extLst>
           </p:cNvPr>
-          <p:cNvGrpSpPr/>
+          <p:cNvGrpSpPr>
+            <a:grpSpLocks noChangeAspect="1"/>
+          </p:cNvGrpSpPr>
           <p:nvPr/>
         </p:nvGrpSpPr>
         <p:grpSpPr>
           <a:xfrm>
-            <a:off x="2455935" y="1540753"/>
-            <a:ext cx="7187364" cy="3301765"/>
+            <a:off x="398276" y="811553"/>
+            <a:ext cx="11395447" cy="5234894"/>
             <a:chOff x="2251463" y="1540753"/>
             <a:chExt cx="7187364" cy="3301765"/>
           </a:xfrm>
@@ -3443,7 +3445,7 @@
               <a:p>
                 <a:pPr algn="ctr"/>
                 <a:r>
-                  <a:rPr lang="en-US" dirty="0">
+                  <a:rPr lang="en-US" sz="2400" dirty="0">
                     <a:solidFill>
                       <a:schemeClr val="tx1"/>
                     </a:solidFill>
@@ -3452,7 +3454,7 @@
                   <a:t>Are cats </a:t>
                 </a:r>
                 <a:r>
-                  <a:rPr lang="en-US" b="1" dirty="0">
+                  <a:rPr lang="en-US" sz="2400" b="1" dirty="0">
                     <a:solidFill>
                       <a:schemeClr val="tx1"/>
                     </a:solidFill>
@@ -3461,7 +3463,7 @@
                   <a:t>made of stuff</a:t>
                 </a:r>
                 <a:r>
-                  <a:rPr lang="en-US" dirty="0">
+                  <a:rPr lang="en-US" sz="2400" dirty="0">
                     <a:solidFill>
                       <a:schemeClr val="tx1"/>
                     </a:solidFill>
@@ -3520,7 +3522,7 @@
               <a:p>
                 <a:pPr algn="ctr"/>
                 <a:r>
-                  <a:rPr lang="en-US" dirty="0">
+                  <a:rPr lang="en-US" sz="2400" dirty="0">
                     <a:solidFill>
                       <a:schemeClr val="tx1"/>
                     </a:solidFill>
@@ -3529,7 +3531,7 @@
                   <a:t>Do cats </a:t>
                 </a:r>
                 <a:r>
-                  <a:rPr lang="en-US" b="1" dirty="0">
+                  <a:rPr lang="en-US" sz="2400" b="1" dirty="0">
                     <a:solidFill>
                       <a:schemeClr val="tx1"/>
                     </a:solidFill>
@@ -3538,7 +3540,7 @@
                   <a:t>take up space</a:t>
                 </a:r>
                 <a:r>
-                  <a:rPr lang="en-US" dirty="0">
+                  <a:rPr lang="en-US" sz="2400" dirty="0">
                     <a:solidFill>
                       <a:schemeClr val="tx1"/>
                     </a:solidFill>
@@ -3597,7 +3599,7 @@
               <a:p>
                 <a:pPr algn="ctr"/>
                 <a:r>
-                  <a:rPr lang="en-US" dirty="0">
+                  <a:rPr lang="en-US" sz="2400" dirty="0">
                     <a:solidFill>
                       <a:schemeClr val="tx1"/>
                     </a:solidFill>
@@ -3606,7 +3608,7 @@
                   <a:t>Do cats </a:t>
                 </a:r>
                 <a:r>
-                  <a:rPr lang="en-US" b="1" dirty="0">
+                  <a:rPr lang="en-US" sz="2400" b="1" dirty="0">
                     <a:solidFill>
                       <a:schemeClr val="tx1"/>
                     </a:solidFill>
@@ -3615,7 +3617,7 @@
                   <a:t>weigh anything </a:t>
                 </a:r>
                 <a:r>
-                  <a:rPr lang="en-US" dirty="0">
+                  <a:rPr lang="en-US" sz="2400" dirty="0">
                     <a:solidFill>
                       <a:schemeClr val="tx1"/>
                     </a:solidFill>
@@ -3642,9 +3644,9 @@
           <p:grpSpPr>
             <a:xfrm>
               <a:off x="7458253" y="2386327"/>
-              <a:ext cx="1980574" cy="2139823"/>
+              <a:ext cx="1980574" cy="2139822"/>
               <a:chOff x="5282094" y="569706"/>
-              <a:chExt cx="1980574" cy="2139823"/>
+              <a:chExt cx="1980574" cy="2139822"/>
             </a:xfrm>
           </p:grpSpPr>
           <p:sp>
@@ -3695,7 +3697,7 @@
               <a:p>
                 <a:pPr algn="ctr"/>
                 <a:r>
-                  <a:rPr lang="en-US" dirty="0">
+                  <a:rPr lang="en-US" sz="2400" dirty="0">
                     <a:solidFill>
                       <a:schemeClr val="tx1"/>
                     </a:solidFill>
@@ -3754,7 +3756,7 @@
               <a:p>
                 <a:pPr algn="ctr"/>
                 <a:r>
-                  <a:rPr lang="en-US" dirty="0">
+                  <a:rPr lang="en-US" sz="2400" dirty="0">
                     <a:solidFill>
                       <a:schemeClr val="tx1"/>
                     </a:solidFill>
@@ -3813,7 +3815,7 @@
               <a:p>
                 <a:pPr algn="ctr"/>
                 <a:r>
-                  <a:rPr lang="en-US" dirty="0">
+                  <a:rPr lang="en-US" sz="2400" dirty="0">
                     <a:solidFill>
                       <a:schemeClr val="tx1"/>
                     </a:solidFill>
@@ -3845,8 +3847,8 @@
             </p:blipFill>
             <p:spPr>
               <a:xfrm>
-                <a:off x="6071123" y="1046329"/>
-                <a:ext cx="1191545" cy="1663200"/>
+                <a:off x="6071123" y="1046330"/>
+                <a:ext cx="1191545" cy="1663198"/>
               </a:xfrm>
               <a:prstGeom prst="rect">
                 <a:avLst/>
@@ -3941,7 +3943,7 @@
             <a:p>
               <a:pPr algn="ctr"/>
               <a:r>
-                <a:rPr lang="en-US" dirty="0"/>
+                <a:rPr lang="en-US" sz="2400" dirty="0"/>
                 <a:t>Response time (RT)</a:t>
               </a:r>
             </a:p>

</xml_diff>

<commit_message>
Major content and image changes
</commit_message>
<xml_diff>
--- a/images/procedure1.pptx
+++ b/images/procedure1.pptx
@@ -2,12 +2,15 @@
 <file path=ppt/presentation.xml><?xml version="1.0" encoding="utf-8"?>
 <p:presentation xmlns:a="http://schemas.openxmlformats.org/drawingml/2006/main" xmlns:r="http://schemas.openxmlformats.org/officeDocument/2006/relationships" xmlns:p="http://schemas.openxmlformats.org/presentationml/2006/main" saveSubsetFonts="1" autoCompressPictures="0">
   <p:sldMasterIdLst>
-    <p:sldMasterId id="2147483660" r:id="rId1"/>
+    <p:sldMasterId id="2147483672" r:id="rId1"/>
   </p:sldMasterIdLst>
+  <p:notesMasterIdLst>
+    <p:notesMasterId r:id="rId3"/>
+  </p:notesMasterIdLst>
   <p:sldIdLst>
     <p:sldId id="257" r:id="rId2"/>
   </p:sldIdLst>
-  <p:sldSz cx="14400213" cy="6858000"/>
+  <p:sldSz cx="28800425" cy="13716000"/>
   <p:notesSz cx="6858000" cy="9144000"/>
   <p:defaultTextStyle>
     <a:defPPr>
@@ -108,8 +111,449 @@
     <p:ext uri="{EFAFB233-063F-42B5-8137-9DF3F51BA10A}">
       <p15:sldGuideLst xmlns:p15="http://schemas.microsoft.com/office/powerpoint/2012/main"/>
     </p:ext>
+    <p:ext uri="{2D200454-40CA-4A62-9FC3-DE9A4176ACB9}">
+      <p15:notesGuideLst xmlns:p15="http://schemas.microsoft.com/office/powerpoint/2012/main"/>
+    </p:ext>
   </p:extLst>
 </p:presentation>
+</file>
+
+<file path=ppt/notesMasters/notesMaster1.xml><?xml version="1.0" encoding="utf-8"?>
+<p:notesMaster xmlns:a="http://schemas.openxmlformats.org/drawingml/2006/main" xmlns:r="http://schemas.openxmlformats.org/officeDocument/2006/relationships" xmlns:p="http://schemas.openxmlformats.org/presentationml/2006/main">
+  <p:cSld>
+    <p:bg>
+      <p:bgRef idx="1001">
+        <a:schemeClr val="bg1"/>
+      </p:bgRef>
+    </p:bg>
+    <p:spTree>
+      <p:nvGrpSpPr>
+        <p:cNvPr id="1" name=""/>
+        <p:cNvGrpSpPr/>
+        <p:nvPr/>
+      </p:nvGrpSpPr>
+      <p:grpSpPr>
+        <a:xfrm>
+          <a:off x="0" y="0"/>
+          <a:ext cx="0" cy="0"/>
+          <a:chOff x="0" y="0"/>
+          <a:chExt cx="0" cy="0"/>
+        </a:xfrm>
+      </p:grpSpPr>
+      <p:sp>
+        <p:nvSpPr>
+          <p:cNvPr id="2" name="Header Placeholder 1"/>
+          <p:cNvSpPr>
+            <a:spLocks noGrp="1"/>
+          </p:cNvSpPr>
+          <p:nvPr>
+            <p:ph type="hdr" sz="quarter"/>
+          </p:nvPr>
+        </p:nvSpPr>
+        <p:spPr>
+          <a:xfrm>
+            <a:off x="0" y="0"/>
+            <a:ext cx="2971800" cy="458788"/>
+          </a:xfrm>
+          <a:prstGeom prst="rect">
+            <a:avLst/>
+          </a:prstGeom>
+        </p:spPr>
+        <p:txBody>
+          <a:bodyPr vert="horz" lIns="91440" tIns="45720" rIns="91440" bIns="45720" rtlCol="0"/>
+          <a:lstStyle>
+            <a:lvl1pPr algn="l">
+              <a:defRPr sz="1200"/>
+            </a:lvl1pPr>
+          </a:lstStyle>
+          <a:p>
+            <a:endParaRPr lang="en-US"/>
+          </a:p>
+        </p:txBody>
+      </p:sp>
+      <p:sp>
+        <p:nvSpPr>
+          <p:cNvPr id="3" name="Date Placeholder 2"/>
+          <p:cNvSpPr>
+            <a:spLocks noGrp="1"/>
+          </p:cNvSpPr>
+          <p:nvPr>
+            <p:ph type="dt" idx="1"/>
+          </p:nvPr>
+        </p:nvSpPr>
+        <p:spPr>
+          <a:xfrm>
+            <a:off x="3884613" y="0"/>
+            <a:ext cx="2971800" cy="458788"/>
+          </a:xfrm>
+          <a:prstGeom prst="rect">
+            <a:avLst/>
+          </a:prstGeom>
+        </p:spPr>
+        <p:txBody>
+          <a:bodyPr vert="horz" lIns="91440" tIns="45720" rIns="91440" bIns="45720" rtlCol="0"/>
+          <a:lstStyle>
+            <a:lvl1pPr algn="r">
+              <a:defRPr sz="1200"/>
+            </a:lvl1pPr>
+          </a:lstStyle>
+          <a:p>
+            <a:fld id="{342B0777-4D5D-2448-BE6E-6E4518A046C8}" type="datetimeFigureOut">
+              <a:rPr lang="en-US" smtClean="0"/>
+              <a:t>3/19/24</a:t>
+            </a:fld>
+            <a:endParaRPr lang="en-US"/>
+          </a:p>
+        </p:txBody>
+      </p:sp>
+      <p:sp>
+        <p:nvSpPr>
+          <p:cNvPr id="4" name="Slide Image Placeholder 3"/>
+          <p:cNvSpPr>
+            <a:spLocks noGrp="1" noRot="1" noChangeAspect="1"/>
+          </p:cNvSpPr>
+          <p:nvPr>
+            <p:ph type="sldImg" idx="2"/>
+          </p:nvPr>
+        </p:nvSpPr>
+        <p:spPr>
+          <a:xfrm>
+            <a:off x="190500" y="1143000"/>
+            <a:ext cx="6477000" cy="3086100"/>
+          </a:xfrm>
+          <a:prstGeom prst="rect">
+            <a:avLst/>
+          </a:prstGeom>
+          <a:noFill/>
+          <a:ln w="12700">
+            <a:solidFill>
+              <a:prstClr val="black"/>
+            </a:solidFill>
+          </a:ln>
+        </p:spPr>
+        <p:txBody>
+          <a:bodyPr vert="horz" lIns="91440" tIns="45720" rIns="91440" bIns="45720" rtlCol="0" anchor="ctr"/>
+          <a:lstStyle/>
+          <a:p>
+            <a:endParaRPr lang="en-US"/>
+          </a:p>
+        </p:txBody>
+      </p:sp>
+      <p:sp>
+        <p:nvSpPr>
+          <p:cNvPr id="5" name="Notes Placeholder 4"/>
+          <p:cNvSpPr>
+            <a:spLocks noGrp="1"/>
+          </p:cNvSpPr>
+          <p:nvPr>
+            <p:ph type="body" sz="quarter" idx="3"/>
+          </p:nvPr>
+        </p:nvSpPr>
+        <p:spPr>
+          <a:xfrm>
+            <a:off x="685800" y="4400550"/>
+            <a:ext cx="5486400" cy="3600450"/>
+          </a:xfrm>
+          <a:prstGeom prst="rect">
+            <a:avLst/>
+          </a:prstGeom>
+        </p:spPr>
+        <p:txBody>
+          <a:bodyPr vert="horz" lIns="91440" tIns="45720" rIns="91440" bIns="45720" rtlCol="0"/>
+          <a:lstStyle/>
+          <a:p>
+            <a:pPr lvl="0"/>
+            <a:r>
+              <a:rPr lang="en-US"/>
+              <a:t>Click to edit Master text styles</a:t>
+            </a:r>
+          </a:p>
+          <a:p>
+            <a:pPr lvl="1"/>
+            <a:r>
+              <a:rPr lang="en-US"/>
+              <a:t>Second level</a:t>
+            </a:r>
+          </a:p>
+          <a:p>
+            <a:pPr lvl="2"/>
+            <a:r>
+              <a:rPr lang="en-US"/>
+              <a:t>Third level</a:t>
+            </a:r>
+          </a:p>
+          <a:p>
+            <a:pPr lvl="3"/>
+            <a:r>
+              <a:rPr lang="en-US"/>
+              <a:t>Fourth level</a:t>
+            </a:r>
+          </a:p>
+          <a:p>
+            <a:pPr lvl="4"/>
+            <a:r>
+              <a:rPr lang="en-US"/>
+              <a:t>Fifth level</a:t>
+            </a:r>
+          </a:p>
+        </p:txBody>
+      </p:sp>
+      <p:sp>
+        <p:nvSpPr>
+          <p:cNvPr id="6" name="Footer Placeholder 5"/>
+          <p:cNvSpPr>
+            <a:spLocks noGrp="1"/>
+          </p:cNvSpPr>
+          <p:nvPr>
+            <p:ph type="ftr" sz="quarter" idx="4"/>
+          </p:nvPr>
+        </p:nvSpPr>
+        <p:spPr>
+          <a:xfrm>
+            <a:off x="0" y="8685213"/>
+            <a:ext cx="2971800" cy="458787"/>
+          </a:xfrm>
+          <a:prstGeom prst="rect">
+            <a:avLst/>
+          </a:prstGeom>
+        </p:spPr>
+        <p:txBody>
+          <a:bodyPr vert="horz" lIns="91440" tIns="45720" rIns="91440" bIns="45720" rtlCol="0" anchor="b"/>
+          <a:lstStyle>
+            <a:lvl1pPr algn="l">
+              <a:defRPr sz="1200"/>
+            </a:lvl1pPr>
+          </a:lstStyle>
+          <a:p>
+            <a:endParaRPr lang="en-US"/>
+          </a:p>
+        </p:txBody>
+      </p:sp>
+      <p:sp>
+        <p:nvSpPr>
+          <p:cNvPr id="7" name="Slide Number Placeholder 6"/>
+          <p:cNvSpPr>
+            <a:spLocks noGrp="1"/>
+          </p:cNvSpPr>
+          <p:nvPr>
+            <p:ph type="sldNum" sz="quarter" idx="5"/>
+          </p:nvPr>
+        </p:nvSpPr>
+        <p:spPr>
+          <a:xfrm>
+            <a:off x="3884613" y="8685213"/>
+            <a:ext cx="2971800" cy="458787"/>
+          </a:xfrm>
+          <a:prstGeom prst="rect">
+            <a:avLst/>
+          </a:prstGeom>
+        </p:spPr>
+        <p:txBody>
+          <a:bodyPr vert="horz" lIns="91440" tIns="45720" rIns="91440" bIns="45720" rtlCol="0" anchor="b"/>
+          <a:lstStyle>
+            <a:lvl1pPr algn="r">
+              <a:defRPr sz="1200"/>
+            </a:lvl1pPr>
+          </a:lstStyle>
+          <a:p>
+            <a:fld id="{DB0BDAEE-DE4F-5C46-89A3-A855317473B5}" type="slidenum">
+              <a:rPr lang="en-US" smtClean="0"/>
+              <a:t>‹#›</a:t>
+            </a:fld>
+            <a:endParaRPr lang="en-US"/>
+          </a:p>
+        </p:txBody>
+      </p:sp>
+    </p:spTree>
+    <p:extLst>
+      <p:ext uri="{BB962C8B-B14F-4D97-AF65-F5344CB8AC3E}">
+        <p14:creationId xmlns:p14="http://schemas.microsoft.com/office/powerpoint/2010/main" val="2178125959"/>
+      </p:ext>
+    </p:extLst>
+  </p:cSld>
+  <p:clrMap bg1="lt1" tx1="dk1" bg2="lt2" tx2="dk2" accent1="accent1" accent2="accent2" accent3="accent3" accent4="accent4" accent5="accent5" accent6="accent6" hlink="hlink" folHlink="folHlink"/>
+  <p:notesStyle>
+    <a:lvl1pPr marL="0" algn="l" defTabSz="1828800" rtl="0" eaLnBrk="1" latinLnBrk="0" hangingPunct="1">
+      <a:defRPr sz="2400" kern="1200">
+        <a:solidFill>
+          <a:schemeClr val="tx1"/>
+        </a:solidFill>
+        <a:latin typeface="+mn-lt"/>
+        <a:ea typeface="+mn-ea"/>
+        <a:cs typeface="+mn-cs"/>
+      </a:defRPr>
+    </a:lvl1pPr>
+    <a:lvl2pPr marL="914400" algn="l" defTabSz="1828800" rtl="0" eaLnBrk="1" latinLnBrk="0" hangingPunct="1">
+      <a:defRPr sz="2400" kern="1200">
+        <a:solidFill>
+          <a:schemeClr val="tx1"/>
+        </a:solidFill>
+        <a:latin typeface="+mn-lt"/>
+        <a:ea typeface="+mn-ea"/>
+        <a:cs typeface="+mn-cs"/>
+      </a:defRPr>
+    </a:lvl2pPr>
+    <a:lvl3pPr marL="1828800" algn="l" defTabSz="1828800" rtl="0" eaLnBrk="1" latinLnBrk="0" hangingPunct="1">
+      <a:defRPr sz="2400" kern="1200">
+        <a:solidFill>
+          <a:schemeClr val="tx1"/>
+        </a:solidFill>
+        <a:latin typeface="+mn-lt"/>
+        <a:ea typeface="+mn-ea"/>
+        <a:cs typeface="+mn-cs"/>
+      </a:defRPr>
+    </a:lvl3pPr>
+    <a:lvl4pPr marL="2743200" algn="l" defTabSz="1828800" rtl="0" eaLnBrk="1" latinLnBrk="0" hangingPunct="1">
+      <a:defRPr sz="2400" kern="1200">
+        <a:solidFill>
+          <a:schemeClr val="tx1"/>
+        </a:solidFill>
+        <a:latin typeface="+mn-lt"/>
+        <a:ea typeface="+mn-ea"/>
+        <a:cs typeface="+mn-cs"/>
+      </a:defRPr>
+    </a:lvl4pPr>
+    <a:lvl5pPr marL="3657600" algn="l" defTabSz="1828800" rtl="0" eaLnBrk="1" latinLnBrk="0" hangingPunct="1">
+      <a:defRPr sz="2400" kern="1200">
+        <a:solidFill>
+          <a:schemeClr val="tx1"/>
+        </a:solidFill>
+        <a:latin typeface="+mn-lt"/>
+        <a:ea typeface="+mn-ea"/>
+        <a:cs typeface="+mn-cs"/>
+      </a:defRPr>
+    </a:lvl5pPr>
+    <a:lvl6pPr marL="4572000" algn="l" defTabSz="1828800" rtl="0" eaLnBrk="1" latinLnBrk="0" hangingPunct="1">
+      <a:defRPr sz="2400" kern="1200">
+        <a:solidFill>
+          <a:schemeClr val="tx1"/>
+        </a:solidFill>
+        <a:latin typeface="+mn-lt"/>
+        <a:ea typeface="+mn-ea"/>
+        <a:cs typeface="+mn-cs"/>
+      </a:defRPr>
+    </a:lvl6pPr>
+    <a:lvl7pPr marL="5486400" algn="l" defTabSz="1828800" rtl="0" eaLnBrk="1" latinLnBrk="0" hangingPunct="1">
+      <a:defRPr sz="2400" kern="1200">
+        <a:solidFill>
+          <a:schemeClr val="tx1"/>
+        </a:solidFill>
+        <a:latin typeface="+mn-lt"/>
+        <a:ea typeface="+mn-ea"/>
+        <a:cs typeface="+mn-cs"/>
+      </a:defRPr>
+    </a:lvl7pPr>
+    <a:lvl8pPr marL="6400800" algn="l" defTabSz="1828800" rtl="0" eaLnBrk="1" latinLnBrk="0" hangingPunct="1">
+      <a:defRPr sz="2400" kern="1200">
+        <a:solidFill>
+          <a:schemeClr val="tx1"/>
+        </a:solidFill>
+        <a:latin typeface="+mn-lt"/>
+        <a:ea typeface="+mn-ea"/>
+        <a:cs typeface="+mn-cs"/>
+      </a:defRPr>
+    </a:lvl8pPr>
+    <a:lvl9pPr marL="7315200" algn="l" defTabSz="1828800" rtl="0" eaLnBrk="1" latinLnBrk="0" hangingPunct="1">
+      <a:defRPr sz="2400" kern="1200">
+        <a:solidFill>
+          <a:schemeClr val="tx1"/>
+        </a:solidFill>
+        <a:latin typeface="+mn-lt"/>
+        <a:ea typeface="+mn-ea"/>
+        <a:cs typeface="+mn-cs"/>
+      </a:defRPr>
+    </a:lvl9pPr>
+  </p:notesStyle>
+</p:notesMaster>
+</file>
+
+<file path=ppt/notesSlides/notesSlide1.xml><?xml version="1.0" encoding="utf-8"?>
+<p:notes xmlns:a="http://schemas.openxmlformats.org/drawingml/2006/main" xmlns:r="http://schemas.openxmlformats.org/officeDocument/2006/relationships" xmlns:p="http://schemas.openxmlformats.org/presentationml/2006/main">
+  <p:cSld>
+    <p:spTree>
+      <p:nvGrpSpPr>
+        <p:cNvPr id="1" name=""/>
+        <p:cNvGrpSpPr/>
+        <p:nvPr/>
+      </p:nvGrpSpPr>
+      <p:grpSpPr>
+        <a:xfrm>
+          <a:off x="0" y="0"/>
+          <a:ext cx="0" cy="0"/>
+          <a:chOff x="0" y="0"/>
+          <a:chExt cx="0" cy="0"/>
+        </a:xfrm>
+      </p:grpSpPr>
+      <p:sp>
+        <p:nvSpPr>
+          <p:cNvPr id="2" name="Slide Image Placeholder 1"/>
+          <p:cNvSpPr>
+            <a:spLocks noGrp="1" noRot="1" noChangeAspect="1"/>
+          </p:cNvSpPr>
+          <p:nvPr>
+            <p:ph type="sldImg"/>
+          </p:nvPr>
+        </p:nvSpPr>
+        <p:spPr>
+          <a:xfrm>
+            <a:off x="190500" y="1143000"/>
+            <a:ext cx="6477000" cy="3086100"/>
+          </a:xfrm>
+        </p:spPr>
+      </p:sp>
+      <p:sp>
+        <p:nvSpPr>
+          <p:cNvPr id="3" name="Notes Placeholder 2"/>
+          <p:cNvSpPr>
+            <a:spLocks noGrp="1"/>
+          </p:cNvSpPr>
+          <p:nvPr>
+            <p:ph type="body" idx="1"/>
+          </p:nvPr>
+        </p:nvSpPr>
+        <p:spPr/>
+        <p:txBody>
+          <a:bodyPr/>
+          <a:lstStyle/>
+          <a:p>
+            <a:endParaRPr lang="en-US"/>
+          </a:p>
+        </p:txBody>
+      </p:sp>
+      <p:sp>
+        <p:nvSpPr>
+          <p:cNvPr id="4" name="Slide Number Placeholder 3"/>
+          <p:cNvSpPr>
+            <a:spLocks noGrp="1"/>
+          </p:cNvSpPr>
+          <p:nvPr>
+            <p:ph type="sldNum" sz="quarter" idx="5"/>
+          </p:nvPr>
+        </p:nvSpPr>
+        <p:spPr/>
+        <p:txBody>
+          <a:bodyPr/>
+          <a:lstStyle/>
+          <a:p>
+            <a:fld id="{DB0BDAEE-DE4F-5C46-89A3-A855317473B5}" type="slidenum">
+              <a:rPr lang="en-US" smtClean="0"/>
+              <a:t>1</a:t>
+            </a:fld>
+            <a:endParaRPr lang="en-US"/>
+          </a:p>
+        </p:txBody>
+      </p:sp>
+    </p:spTree>
+    <p:extLst>
+      <p:ext uri="{BB962C8B-B14F-4D97-AF65-F5344CB8AC3E}">
+        <p14:creationId xmlns:p14="http://schemas.microsoft.com/office/powerpoint/2010/main" val="2136193385"/>
+      </p:ext>
+    </p:extLst>
+  </p:cSld>
+  <p:clrMapOvr>
+    <a:masterClrMapping/>
+  </p:clrMapOvr>
+</p:notes>
 </file>
 
 <file path=ppt/slideLayouts/slideLayout1.xml><?xml version="1.0" encoding="utf-8"?>
@@ -141,15 +585,15 @@
         </p:nvSpPr>
         <p:spPr>
           <a:xfrm>
-            <a:off x="1800027" y="1122363"/>
-            <a:ext cx="10800160" cy="2387600"/>
+            <a:off x="3600054" y="2244726"/>
+            <a:ext cx="21600319" cy="4775200"/>
           </a:xfrm>
         </p:spPr>
         <p:txBody>
           <a:bodyPr anchor="b"/>
           <a:lstStyle>
             <a:lvl1pPr algn="ctr">
-              <a:defRPr sz="6000"/>
+              <a:defRPr sz="12000"/>
             </a:lvl1pPr>
           </a:lstStyle>
           <a:p>
@@ -173,8 +617,8 @@
         </p:nvSpPr>
         <p:spPr>
           <a:xfrm>
-            <a:off x="1800027" y="3602038"/>
-            <a:ext cx="10800160" cy="1655762"/>
+            <a:off x="3600054" y="7204076"/>
+            <a:ext cx="21600319" cy="3311524"/>
           </a:xfrm>
         </p:spPr>
         <p:txBody>
@@ -182,39 +626,39 @@
           <a:lstStyle>
             <a:lvl1pPr marL="0" indent="0" algn="ctr">
               <a:buNone/>
-              <a:defRPr sz="2400"/>
+              <a:defRPr sz="4800"/>
             </a:lvl1pPr>
-            <a:lvl2pPr marL="457200" indent="0" algn="ctr">
-              <a:buNone/>
-              <a:defRPr sz="2000"/>
+            <a:lvl2pPr marL="914400" indent="0" algn="ctr">
+              <a:buNone/>
+              <a:defRPr sz="4000"/>
             </a:lvl2pPr>
-            <a:lvl3pPr marL="914400" indent="0" algn="ctr">
-              <a:buNone/>
-              <a:defRPr sz="1800"/>
+            <a:lvl3pPr marL="1828800" indent="0" algn="ctr">
+              <a:buNone/>
+              <a:defRPr sz="3600"/>
             </a:lvl3pPr>
-            <a:lvl4pPr marL="1371600" indent="0" algn="ctr">
-              <a:buNone/>
-              <a:defRPr sz="1600"/>
+            <a:lvl4pPr marL="2743200" indent="0" algn="ctr">
+              <a:buNone/>
+              <a:defRPr sz="3200"/>
             </a:lvl4pPr>
-            <a:lvl5pPr marL="1828800" indent="0" algn="ctr">
-              <a:buNone/>
-              <a:defRPr sz="1600"/>
+            <a:lvl5pPr marL="3657600" indent="0" algn="ctr">
+              <a:buNone/>
+              <a:defRPr sz="3200"/>
             </a:lvl5pPr>
-            <a:lvl6pPr marL="2286000" indent="0" algn="ctr">
-              <a:buNone/>
-              <a:defRPr sz="1600"/>
+            <a:lvl6pPr marL="4572000" indent="0" algn="ctr">
+              <a:buNone/>
+              <a:defRPr sz="3200"/>
             </a:lvl6pPr>
-            <a:lvl7pPr marL="2743200" indent="0" algn="ctr">
-              <a:buNone/>
-              <a:defRPr sz="1600"/>
+            <a:lvl7pPr marL="5486400" indent="0" algn="ctr">
+              <a:buNone/>
+              <a:defRPr sz="3200"/>
             </a:lvl7pPr>
-            <a:lvl8pPr marL="3200400" indent="0" algn="ctr">
-              <a:buNone/>
-              <a:defRPr sz="1600"/>
+            <a:lvl8pPr marL="6400800" indent="0" algn="ctr">
+              <a:buNone/>
+              <a:defRPr sz="3200"/>
             </a:lvl8pPr>
-            <a:lvl9pPr marL="3657600" indent="0" algn="ctr">
-              <a:buNone/>
-              <a:defRPr sz="1600"/>
+            <a:lvl9pPr marL="7315200" indent="0" algn="ctr">
+              <a:buNone/>
+              <a:defRPr sz="3200"/>
             </a:lvl9pPr>
           </a:lstStyle>
           <a:p>
@@ -243,7 +687,7 @@
           <a:p>
             <a:fld id="{D12CECE7-E485-8341-8DE4-4859C7E44F28}" type="datetimeFigureOut">
               <a:rPr lang="en-US" smtClean="0"/>
-              <a:t>3/18/24</a:t>
+              <a:t>3/19/24</a:t>
             </a:fld>
             <a:endParaRPr lang="en-US"/>
           </a:p>
@@ -294,7 +738,7 @@
     </p:spTree>
     <p:extLst>
       <p:ext uri="{BB962C8B-B14F-4D97-AF65-F5344CB8AC3E}">
-        <p14:creationId xmlns:p14="http://schemas.microsoft.com/office/powerpoint/2010/main" val="1188733942"/>
+        <p14:creationId xmlns:p14="http://schemas.microsoft.com/office/powerpoint/2010/main" val="578120320"/>
       </p:ext>
     </p:extLst>
   </p:cSld>
@@ -413,7 +857,7 @@
           <a:p>
             <a:fld id="{D12CECE7-E485-8341-8DE4-4859C7E44F28}" type="datetimeFigureOut">
               <a:rPr lang="en-US" smtClean="0"/>
-              <a:t>3/18/24</a:t>
+              <a:t>3/19/24</a:t>
             </a:fld>
             <a:endParaRPr lang="en-US"/>
           </a:p>
@@ -464,7 +908,7 @@
     </p:spTree>
     <p:extLst>
       <p:ext uri="{BB962C8B-B14F-4D97-AF65-F5344CB8AC3E}">
-        <p14:creationId xmlns:p14="http://schemas.microsoft.com/office/powerpoint/2010/main" val="3445206206"/>
+        <p14:creationId xmlns:p14="http://schemas.microsoft.com/office/powerpoint/2010/main" val="1461179142"/>
       </p:ext>
     </p:extLst>
   </p:cSld>
@@ -503,8 +947,8 @@
         </p:nvSpPr>
         <p:spPr>
           <a:xfrm>
-            <a:off x="10305152" y="365125"/>
-            <a:ext cx="3105046" cy="5811838"/>
+            <a:off x="20610304" y="730250"/>
+            <a:ext cx="6210092" cy="11623676"/>
           </a:xfrm>
         </p:spPr>
         <p:txBody>
@@ -531,8 +975,8 @@
         </p:nvSpPr>
         <p:spPr>
           <a:xfrm>
-            <a:off x="990015" y="365125"/>
-            <a:ext cx="9135135" cy="5811838"/>
+            <a:off x="1980029" y="730250"/>
+            <a:ext cx="18270270" cy="11623676"/>
           </a:xfrm>
         </p:spPr>
         <p:txBody>
@@ -593,7 +1037,7 @@
           <a:p>
             <a:fld id="{D12CECE7-E485-8341-8DE4-4859C7E44F28}" type="datetimeFigureOut">
               <a:rPr lang="en-US" smtClean="0"/>
-              <a:t>3/18/24</a:t>
+              <a:t>3/19/24</a:t>
             </a:fld>
             <a:endParaRPr lang="en-US"/>
           </a:p>
@@ -644,7 +1088,7 @@
     </p:spTree>
     <p:extLst>
       <p:ext uri="{BB962C8B-B14F-4D97-AF65-F5344CB8AC3E}">
-        <p14:creationId xmlns:p14="http://schemas.microsoft.com/office/powerpoint/2010/main" val="4173409569"/>
+        <p14:creationId xmlns:p14="http://schemas.microsoft.com/office/powerpoint/2010/main" val="4109907855"/>
       </p:ext>
     </p:extLst>
   </p:cSld>
@@ -763,7 +1207,7 @@
           <a:p>
             <a:fld id="{D12CECE7-E485-8341-8DE4-4859C7E44F28}" type="datetimeFigureOut">
               <a:rPr lang="en-US" smtClean="0"/>
-              <a:t>3/18/24</a:t>
+              <a:t>3/19/24</a:t>
             </a:fld>
             <a:endParaRPr lang="en-US"/>
           </a:p>
@@ -814,7 +1258,7 @@
     </p:spTree>
     <p:extLst>
       <p:ext uri="{BB962C8B-B14F-4D97-AF65-F5344CB8AC3E}">
-        <p14:creationId xmlns:p14="http://schemas.microsoft.com/office/powerpoint/2010/main" val="2256085399"/>
+        <p14:creationId xmlns:p14="http://schemas.microsoft.com/office/powerpoint/2010/main" val="2120649620"/>
       </p:ext>
     </p:extLst>
   </p:cSld>
@@ -853,15 +1297,15 @@
         </p:nvSpPr>
         <p:spPr>
           <a:xfrm>
-            <a:off x="982514" y="1709738"/>
-            <a:ext cx="12420184" cy="2852737"/>
+            <a:off x="1965029" y="3419477"/>
+            <a:ext cx="24840367" cy="5705474"/>
           </a:xfrm>
         </p:spPr>
         <p:txBody>
           <a:bodyPr anchor="b"/>
           <a:lstStyle>
             <a:lvl1pPr>
-              <a:defRPr sz="6000"/>
+              <a:defRPr sz="12000"/>
             </a:lvl1pPr>
           </a:lstStyle>
           <a:p>
@@ -885,8 +1329,8 @@
         </p:nvSpPr>
         <p:spPr>
           <a:xfrm>
-            <a:off x="982514" y="4589464"/>
-            <a:ext cx="12420184" cy="1500187"/>
+            <a:off x="1965029" y="9178927"/>
+            <a:ext cx="24840367" cy="3000374"/>
           </a:xfrm>
         </p:spPr>
         <p:txBody>
@@ -894,7 +1338,7 @@
           <a:lstStyle>
             <a:lvl1pPr marL="0" indent="0">
               <a:buNone/>
-              <a:defRPr sz="2400">
+              <a:defRPr sz="4800">
                 <a:solidFill>
                   <a:schemeClr val="tx1">
                     <a:tint val="82000"/>
@@ -902,9 +1346,9 @@
                 </a:solidFill>
               </a:defRPr>
             </a:lvl1pPr>
-            <a:lvl2pPr marL="457200" indent="0">
-              <a:buNone/>
-              <a:defRPr sz="2000">
+            <a:lvl2pPr marL="914400" indent="0">
+              <a:buNone/>
+              <a:defRPr sz="4000">
                 <a:solidFill>
                   <a:schemeClr val="tx1">
                     <a:tint val="82000"/>
@@ -912,9 +1356,9 @@
                 </a:solidFill>
               </a:defRPr>
             </a:lvl2pPr>
-            <a:lvl3pPr marL="914400" indent="0">
-              <a:buNone/>
-              <a:defRPr sz="1800">
+            <a:lvl3pPr marL="1828800" indent="0">
+              <a:buNone/>
+              <a:defRPr sz="3600">
                 <a:solidFill>
                   <a:schemeClr val="tx1">
                     <a:tint val="82000"/>
@@ -922,9 +1366,9 @@
                 </a:solidFill>
               </a:defRPr>
             </a:lvl3pPr>
-            <a:lvl4pPr marL="1371600" indent="0">
-              <a:buNone/>
-              <a:defRPr sz="1600">
+            <a:lvl4pPr marL="2743200" indent="0">
+              <a:buNone/>
+              <a:defRPr sz="3200">
                 <a:solidFill>
                   <a:schemeClr val="tx1">
                     <a:tint val="82000"/>
@@ -932,9 +1376,9 @@
                 </a:solidFill>
               </a:defRPr>
             </a:lvl4pPr>
-            <a:lvl5pPr marL="1828800" indent="0">
-              <a:buNone/>
-              <a:defRPr sz="1600">
+            <a:lvl5pPr marL="3657600" indent="0">
+              <a:buNone/>
+              <a:defRPr sz="3200">
                 <a:solidFill>
                   <a:schemeClr val="tx1">
                     <a:tint val="82000"/>
@@ -942,9 +1386,9 @@
                 </a:solidFill>
               </a:defRPr>
             </a:lvl5pPr>
-            <a:lvl6pPr marL="2286000" indent="0">
-              <a:buNone/>
-              <a:defRPr sz="1600">
+            <a:lvl6pPr marL="4572000" indent="0">
+              <a:buNone/>
+              <a:defRPr sz="3200">
                 <a:solidFill>
                   <a:schemeClr val="tx1">
                     <a:tint val="82000"/>
@@ -952,9 +1396,9 @@
                 </a:solidFill>
               </a:defRPr>
             </a:lvl6pPr>
-            <a:lvl7pPr marL="2743200" indent="0">
-              <a:buNone/>
-              <a:defRPr sz="1600">
+            <a:lvl7pPr marL="5486400" indent="0">
+              <a:buNone/>
+              <a:defRPr sz="3200">
                 <a:solidFill>
                   <a:schemeClr val="tx1">
                     <a:tint val="82000"/>
@@ -962,9 +1406,9 @@
                 </a:solidFill>
               </a:defRPr>
             </a:lvl7pPr>
-            <a:lvl8pPr marL="3200400" indent="0">
-              <a:buNone/>
-              <a:defRPr sz="1600">
+            <a:lvl8pPr marL="6400800" indent="0">
+              <a:buNone/>
+              <a:defRPr sz="3200">
                 <a:solidFill>
                   <a:schemeClr val="tx1">
                     <a:tint val="82000"/>
@@ -972,9 +1416,9 @@
                 </a:solidFill>
               </a:defRPr>
             </a:lvl8pPr>
-            <a:lvl9pPr marL="3657600" indent="0">
-              <a:buNone/>
-              <a:defRPr sz="1600">
+            <a:lvl9pPr marL="7315200" indent="0">
+              <a:buNone/>
+              <a:defRPr sz="3200">
                 <a:solidFill>
                   <a:schemeClr val="tx1">
                     <a:tint val="82000"/>
@@ -1009,7 +1453,7 @@
           <a:p>
             <a:fld id="{D12CECE7-E485-8341-8DE4-4859C7E44F28}" type="datetimeFigureOut">
               <a:rPr lang="en-US" smtClean="0"/>
-              <a:t>3/18/24</a:t>
+              <a:t>3/19/24</a:t>
             </a:fld>
             <a:endParaRPr lang="en-US"/>
           </a:p>
@@ -1060,7 +1504,7 @@
     </p:spTree>
     <p:extLst>
       <p:ext uri="{BB962C8B-B14F-4D97-AF65-F5344CB8AC3E}">
-        <p14:creationId xmlns:p14="http://schemas.microsoft.com/office/powerpoint/2010/main" val="312895238"/>
+        <p14:creationId xmlns:p14="http://schemas.microsoft.com/office/powerpoint/2010/main" val="3854321565"/>
       </p:ext>
     </p:extLst>
   </p:cSld>
@@ -1122,8 +1566,8 @@
         </p:nvSpPr>
         <p:spPr>
           <a:xfrm>
-            <a:off x="990014" y="1825625"/>
-            <a:ext cx="6120091" cy="4351338"/>
+            <a:off x="1980031" y="3651250"/>
+            <a:ext cx="12240180" cy="8702676"/>
           </a:xfrm>
         </p:spPr>
         <p:txBody>
@@ -1179,8 +1623,8 @@
         </p:nvSpPr>
         <p:spPr>
           <a:xfrm>
-            <a:off x="7290108" y="1825625"/>
-            <a:ext cx="6120091" cy="4351338"/>
+            <a:off x="14580216" y="3651250"/>
+            <a:ext cx="12240180" cy="8702676"/>
           </a:xfrm>
         </p:spPr>
         <p:txBody>
@@ -1241,7 +1685,7 @@
           <a:p>
             <a:fld id="{D12CECE7-E485-8341-8DE4-4859C7E44F28}" type="datetimeFigureOut">
               <a:rPr lang="en-US" smtClean="0"/>
-              <a:t>3/18/24</a:t>
+              <a:t>3/19/24</a:t>
             </a:fld>
             <a:endParaRPr lang="en-US"/>
           </a:p>
@@ -1292,7 +1736,7 @@
     </p:spTree>
     <p:extLst>
       <p:ext uri="{BB962C8B-B14F-4D97-AF65-F5344CB8AC3E}">
-        <p14:creationId xmlns:p14="http://schemas.microsoft.com/office/powerpoint/2010/main" val="2126702471"/>
+        <p14:creationId xmlns:p14="http://schemas.microsoft.com/office/powerpoint/2010/main" val="1821005831"/>
       </p:ext>
     </p:extLst>
   </p:cSld>
@@ -1331,8 +1775,8 @@
         </p:nvSpPr>
         <p:spPr>
           <a:xfrm>
-            <a:off x="991890" y="365126"/>
-            <a:ext cx="12420184" cy="1325563"/>
+            <a:off x="1983781" y="730251"/>
+            <a:ext cx="24840367" cy="2651126"/>
           </a:xfrm>
         </p:spPr>
         <p:txBody>
@@ -1359,8 +1803,8 @@
         </p:nvSpPr>
         <p:spPr>
           <a:xfrm>
-            <a:off x="991891" y="1681163"/>
-            <a:ext cx="6091965" cy="823912"/>
+            <a:off x="1983782" y="3362326"/>
+            <a:ext cx="12183929" cy="1647824"/>
           </a:xfrm>
         </p:spPr>
         <p:txBody>
@@ -1368,39 +1812,39 @@
           <a:lstStyle>
             <a:lvl1pPr marL="0" indent="0">
               <a:buNone/>
-              <a:defRPr sz="2400" b="1"/>
+              <a:defRPr sz="4800" b="1"/>
             </a:lvl1pPr>
-            <a:lvl2pPr marL="457200" indent="0">
-              <a:buNone/>
-              <a:defRPr sz="2000" b="1"/>
+            <a:lvl2pPr marL="914400" indent="0">
+              <a:buNone/>
+              <a:defRPr sz="4000" b="1"/>
             </a:lvl2pPr>
-            <a:lvl3pPr marL="914400" indent="0">
-              <a:buNone/>
-              <a:defRPr sz="1800" b="1"/>
+            <a:lvl3pPr marL="1828800" indent="0">
+              <a:buNone/>
+              <a:defRPr sz="3600" b="1"/>
             </a:lvl3pPr>
-            <a:lvl4pPr marL="1371600" indent="0">
-              <a:buNone/>
-              <a:defRPr sz="1600" b="1"/>
+            <a:lvl4pPr marL="2743200" indent="0">
+              <a:buNone/>
+              <a:defRPr sz="3200" b="1"/>
             </a:lvl4pPr>
-            <a:lvl5pPr marL="1828800" indent="0">
-              <a:buNone/>
-              <a:defRPr sz="1600" b="1"/>
+            <a:lvl5pPr marL="3657600" indent="0">
+              <a:buNone/>
+              <a:defRPr sz="3200" b="1"/>
             </a:lvl5pPr>
-            <a:lvl6pPr marL="2286000" indent="0">
-              <a:buNone/>
-              <a:defRPr sz="1600" b="1"/>
+            <a:lvl6pPr marL="4572000" indent="0">
+              <a:buNone/>
+              <a:defRPr sz="3200" b="1"/>
             </a:lvl6pPr>
-            <a:lvl7pPr marL="2743200" indent="0">
-              <a:buNone/>
-              <a:defRPr sz="1600" b="1"/>
+            <a:lvl7pPr marL="5486400" indent="0">
+              <a:buNone/>
+              <a:defRPr sz="3200" b="1"/>
             </a:lvl7pPr>
-            <a:lvl8pPr marL="3200400" indent="0">
-              <a:buNone/>
-              <a:defRPr sz="1600" b="1"/>
+            <a:lvl8pPr marL="6400800" indent="0">
+              <a:buNone/>
+              <a:defRPr sz="3200" b="1"/>
             </a:lvl8pPr>
-            <a:lvl9pPr marL="3657600" indent="0">
-              <a:buNone/>
-              <a:defRPr sz="1600" b="1"/>
+            <a:lvl9pPr marL="7315200" indent="0">
+              <a:buNone/>
+              <a:defRPr sz="3200" b="1"/>
             </a:lvl9pPr>
           </a:lstStyle>
           <a:p>
@@ -1424,8 +1868,8 @@
         </p:nvSpPr>
         <p:spPr>
           <a:xfrm>
-            <a:off x="991891" y="2505075"/>
-            <a:ext cx="6091965" cy="3684588"/>
+            <a:off x="1983782" y="5010150"/>
+            <a:ext cx="12183929" cy="7369176"/>
           </a:xfrm>
         </p:spPr>
         <p:txBody>
@@ -1481,8 +1925,8 @@
         </p:nvSpPr>
         <p:spPr>
           <a:xfrm>
-            <a:off x="7290108" y="1681163"/>
-            <a:ext cx="6121966" cy="823912"/>
+            <a:off x="14580216" y="3362326"/>
+            <a:ext cx="12243932" cy="1647824"/>
           </a:xfrm>
         </p:spPr>
         <p:txBody>
@@ -1490,39 +1934,39 @@
           <a:lstStyle>
             <a:lvl1pPr marL="0" indent="0">
               <a:buNone/>
-              <a:defRPr sz="2400" b="1"/>
+              <a:defRPr sz="4800" b="1"/>
             </a:lvl1pPr>
-            <a:lvl2pPr marL="457200" indent="0">
-              <a:buNone/>
-              <a:defRPr sz="2000" b="1"/>
+            <a:lvl2pPr marL="914400" indent="0">
+              <a:buNone/>
+              <a:defRPr sz="4000" b="1"/>
             </a:lvl2pPr>
-            <a:lvl3pPr marL="914400" indent="0">
-              <a:buNone/>
-              <a:defRPr sz="1800" b="1"/>
+            <a:lvl3pPr marL="1828800" indent="0">
+              <a:buNone/>
+              <a:defRPr sz="3600" b="1"/>
             </a:lvl3pPr>
-            <a:lvl4pPr marL="1371600" indent="0">
-              <a:buNone/>
-              <a:defRPr sz="1600" b="1"/>
+            <a:lvl4pPr marL="2743200" indent="0">
+              <a:buNone/>
+              <a:defRPr sz="3200" b="1"/>
             </a:lvl4pPr>
-            <a:lvl5pPr marL="1828800" indent="0">
-              <a:buNone/>
-              <a:defRPr sz="1600" b="1"/>
+            <a:lvl5pPr marL="3657600" indent="0">
+              <a:buNone/>
+              <a:defRPr sz="3200" b="1"/>
             </a:lvl5pPr>
-            <a:lvl6pPr marL="2286000" indent="0">
-              <a:buNone/>
-              <a:defRPr sz="1600" b="1"/>
+            <a:lvl6pPr marL="4572000" indent="0">
+              <a:buNone/>
+              <a:defRPr sz="3200" b="1"/>
             </a:lvl6pPr>
-            <a:lvl7pPr marL="2743200" indent="0">
-              <a:buNone/>
-              <a:defRPr sz="1600" b="1"/>
+            <a:lvl7pPr marL="5486400" indent="0">
+              <a:buNone/>
+              <a:defRPr sz="3200" b="1"/>
             </a:lvl7pPr>
-            <a:lvl8pPr marL="3200400" indent="0">
-              <a:buNone/>
-              <a:defRPr sz="1600" b="1"/>
+            <a:lvl8pPr marL="6400800" indent="0">
+              <a:buNone/>
+              <a:defRPr sz="3200" b="1"/>
             </a:lvl8pPr>
-            <a:lvl9pPr marL="3657600" indent="0">
-              <a:buNone/>
-              <a:defRPr sz="1600" b="1"/>
+            <a:lvl9pPr marL="7315200" indent="0">
+              <a:buNone/>
+              <a:defRPr sz="3200" b="1"/>
             </a:lvl9pPr>
           </a:lstStyle>
           <a:p>
@@ -1546,8 +1990,8 @@
         </p:nvSpPr>
         <p:spPr>
           <a:xfrm>
-            <a:off x="7290108" y="2505075"/>
-            <a:ext cx="6121966" cy="3684588"/>
+            <a:off x="14580216" y="5010150"/>
+            <a:ext cx="12243932" cy="7369176"/>
           </a:xfrm>
         </p:spPr>
         <p:txBody>
@@ -1608,7 +2052,7 @@
           <a:p>
             <a:fld id="{D12CECE7-E485-8341-8DE4-4859C7E44F28}" type="datetimeFigureOut">
               <a:rPr lang="en-US" smtClean="0"/>
-              <a:t>3/18/24</a:t>
+              <a:t>3/19/24</a:t>
             </a:fld>
             <a:endParaRPr lang="en-US"/>
           </a:p>
@@ -1659,7 +2103,7 @@
     </p:spTree>
     <p:extLst>
       <p:ext uri="{BB962C8B-B14F-4D97-AF65-F5344CB8AC3E}">
-        <p14:creationId xmlns:p14="http://schemas.microsoft.com/office/powerpoint/2010/main" val="4224576075"/>
+        <p14:creationId xmlns:p14="http://schemas.microsoft.com/office/powerpoint/2010/main" val="2103971361"/>
       </p:ext>
     </p:extLst>
   </p:cSld>
@@ -1726,7 +2170,7 @@
           <a:p>
             <a:fld id="{D12CECE7-E485-8341-8DE4-4859C7E44F28}" type="datetimeFigureOut">
               <a:rPr lang="en-US" smtClean="0"/>
-              <a:t>3/18/24</a:t>
+              <a:t>3/19/24</a:t>
             </a:fld>
             <a:endParaRPr lang="en-US"/>
           </a:p>
@@ -1777,7 +2221,7 @@
     </p:spTree>
     <p:extLst>
       <p:ext uri="{BB962C8B-B14F-4D97-AF65-F5344CB8AC3E}">
-        <p14:creationId xmlns:p14="http://schemas.microsoft.com/office/powerpoint/2010/main" val="4145364561"/>
+        <p14:creationId xmlns:p14="http://schemas.microsoft.com/office/powerpoint/2010/main" val="65979390"/>
       </p:ext>
     </p:extLst>
   </p:cSld>
@@ -1821,7 +2265,7 @@
           <a:p>
             <a:fld id="{D12CECE7-E485-8341-8DE4-4859C7E44F28}" type="datetimeFigureOut">
               <a:rPr lang="en-US" smtClean="0"/>
-              <a:t>3/18/24</a:t>
+              <a:t>3/19/24</a:t>
             </a:fld>
             <a:endParaRPr lang="en-US"/>
           </a:p>
@@ -1872,7 +2316,7 @@
     </p:spTree>
     <p:extLst>
       <p:ext uri="{BB962C8B-B14F-4D97-AF65-F5344CB8AC3E}">
-        <p14:creationId xmlns:p14="http://schemas.microsoft.com/office/powerpoint/2010/main" val="3667125982"/>
+        <p14:creationId xmlns:p14="http://schemas.microsoft.com/office/powerpoint/2010/main" val="704595282"/>
       </p:ext>
     </p:extLst>
   </p:cSld>
@@ -1911,15 +2355,15 @@
         </p:nvSpPr>
         <p:spPr>
           <a:xfrm>
-            <a:off x="991891" y="457200"/>
-            <a:ext cx="4644443" cy="1600200"/>
+            <a:off x="1983782" y="914400"/>
+            <a:ext cx="9288886" cy="3200400"/>
           </a:xfrm>
         </p:spPr>
         <p:txBody>
           <a:bodyPr anchor="b"/>
           <a:lstStyle>
             <a:lvl1pPr>
-              <a:defRPr sz="3200"/>
+              <a:defRPr sz="6400"/>
             </a:lvl1pPr>
           </a:lstStyle>
           <a:p>
@@ -1943,38 +2387,132 @@
         </p:nvSpPr>
         <p:spPr>
           <a:xfrm>
-            <a:off x="6121966" y="987426"/>
-            <a:ext cx="7290108" cy="4873625"/>
+            <a:off x="12243932" y="1974851"/>
+            <a:ext cx="14580215" cy="9747250"/>
           </a:xfrm>
         </p:spPr>
         <p:txBody>
           <a:bodyPr/>
           <a:lstStyle>
             <a:lvl1pPr>
+              <a:defRPr sz="6400"/>
+            </a:lvl1pPr>
+            <a:lvl2pPr>
+              <a:defRPr sz="5600"/>
+            </a:lvl2pPr>
+            <a:lvl3pPr>
+              <a:defRPr sz="4800"/>
+            </a:lvl3pPr>
+            <a:lvl4pPr>
+              <a:defRPr sz="4000"/>
+            </a:lvl4pPr>
+            <a:lvl5pPr>
+              <a:defRPr sz="4000"/>
+            </a:lvl5pPr>
+            <a:lvl6pPr>
+              <a:defRPr sz="4000"/>
+            </a:lvl6pPr>
+            <a:lvl7pPr>
+              <a:defRPr sz="4000"/>
+            </a:lvl7pPr>
+            <a:lvl8pPr>
+              <a:defRPr sz="4000"/>
+            </a:lvl8pPr>
+            <a:lvl9pPr>
+              <a:defRPr sz="4000"/>
+            </a:lvl9pPr>
+          </a:lstStyle>
+          <a:p>
+            <a:pPr lvl="0"/>
+            <a:r>
+              <a:rPr lang="en-US"/>
+              <a:t>Click to edit Master text styles</a:t>
+            </a:r>
+          </a:p>
+          <a:p>
+            <a:pPr lvl="1"/>
+            <a:r>
+              <a:rPr lang="en-US"/>
+              <a:t>Second level</a:t>
+            </a:r>
+          </a:p>
+          <a:p>
+            <a:pPr lvl="2"/>
+            <a:r>
+              <a:rPr lang="en-US"/>
+              <a:t>Third level</a:t>
+            </a:r>
+          </a:p>
+          <a:p>
+            <a:pPr lvl="3"/>
+            <a:r>
+              <a:rPr lang="en-US"/>
+              <a:t>Fourth level</a:t>
+            </a:r>
+          </a:p>
+          <a:p>
+            <a:pPr lvl="4"/>
+            <a:r>
+              <a:rPr lang="en-US"/>
+              <a:t>Fifth level</a:t>
+            </a:r>
+            <a:endParaRPr lang="en-US" dirty="0"/>
+          </a:p>
+        </p:txBody>
+      </p:sp>
+      <p:sp>
+        <p:nvSpPr>
+          <p:cNvPr id="4" name="Text Placeholder 3"/>
+          <p:cNvSpPr>
+            <a:spLocks noGrp="1"/>
+          </p:cNvSpPr>
+          <p:nvPr>
+            <p:ph type="body" sz="half" idx="2"/>
+          </p:nvPr>
+        </p:nvSpPr>
+        <p:spPr>
+          <a:xfrm>
+            <a:off x="1983782" y="4114800"/>
+            <a:ext cx="9288886" cy="7623176"/>
+          </a:xfrm>
+        </p:spPr>
+        <p:txBody>
+          <a:bodyPr/>
+          <a:lstStyle>
+            <a:lvl1pPr marL="0" indent="0">
+              <a:buNone/>
               <a:defRPr sz="3200"/>
             </a:lvl1pPr>
-            <a:lvl2pPr>
+            <a:lvl2pPr marL="914400" indent="0">
+              <a:buNone/>
               <a:defRPr sz="2800"/>
             </a:lvl2pPr>
-            <a:lvl3pPr>
+            <a:lvl3pPr marL="1828800" indent="0">
+              <a:buNone/>
               <a:defRPr sz="2400"/>
             </a:lvl3pPr>
-            <a:lvl4pPr>
+            <a:lvl4pPr marL="2743200" indent="0">
+              <a:buNone/>
               <a:defRPr sz="2000"/>
             </a:lvl4pPr>
-            <a:lvl5pPr>
+            <a:lvl5pPr marL="3657600" indent="0">
+              <a:buNone/>
               <a:defRPr sz="2000"/>
             </a:lvl5pPr>
-            <a:lvl6pPr>
+            <a:lvl6pPr marL="4572000" indent="0">
+              <a:buNone/>
               <a:defRPr sz="2000"/>
             </a:lvl6pPr>
-            <a:lvl7pPr>
+            <a:lvl7pPr marL="5486400" indent="0">
+              <a:buNone/>
               <a:defRPr sz="2000"/>
             </a:lvl7pPr>
-            <a:lvl8pPr>
+            <a:lvl8pPr marL="6400800" indent="0">
+              <a:buNone/>
               <a:defRPr sz="2000"/>
             </a:lvl8pPr>
-            <a:lvl9pPr>
+            <a:lvl9pPr marL="7315200" indent="0">
+              <a:buNone/>
               <a:defRPr sz="2000"/>
             </a:lvl9pPr>
           </a:lstStyle>
@@ -1985,100 +2523,6 @@
               <a:t>Click to edit Master text styles</a:t>
             </a:r>
           </a:p>
-          <a:p>
-            <a:pPr lvl="1"/>
-            <a:r>
-              <a:rPr lang="en-US"/>
-              <a:t>Second level</a:t>
-            </a:r>
-          </a:p>
-          <a:p>
-            <a:pPr lvl="2"/>
-            <a:r>
-              <a:rPr lang="en-US"/>
-              <a:t>Third level</a:t>
-            </a:r>
-          </a:p>
-          <a:p>
-            <a:pPr lvl="3"/>
-            <a:r>
-              <a:rPr lang="en-US"/>
-              <a:t>Fourth level</a:t>
-            </a:r>
-          </a:p>
-          <a:p>
-            <a:pPr lvl="4"/>
-            <a:r>
-              <a:rPr lang="en-US"/>
-              <a:t>Fifth level</a:t>
-            </a:r>
-            <a:endParaRPr lang="en-US" dirty="0"/>
-          </a:p>
-        </p:txBody>
-      </p:sp>
-      <p:sp>
-        <p:nvSpPr>
-          <p:cNvPr id="4" name="Text Placeholder 3"/>
-          <p:cNvSpPr>
-            <a:spLocks noGrp="1"/>
-          </p:cNvSpPr>
-          <p:nvPr>
-            <p:ph type="body" sz="half" idx="2"/>
-          </p:nvPr>
-        </p:nvSpPr>
-        <p:spPr>
-          <a:xfrm>
-            <a:off x="991891" y="2057400"/>
-            <a:ext cx="4644443" cy="3811588"/>
-          </a:xfrm>
-        </p:spPr>
-        <p:txBody>
-          <a:bodyPr/>
-          <a:lstStyle>
-            <a:lvl1pPr marL="0" indent="0">
-              <a:buNone/>
-              <a:defRPr sz="1600"/>
-            </a:lvl1pPr>
-            <a:lvl2pPr marL="457200" indent="0">
-              <a:buNone/>
-              <a:defRPr sz="1400"/>
-            </a:lvl2pPr>
-            <a:lvl3pPr marL="914400" indent="0">
-              <a:buNone/>
-              <a:defRPr sz="1200"/>
-            </a:lvl3pPr>
-            <a:lvl4pPr marL="1371600" indent="0">
-              <a:buNone/>
-              <a:defRPr sz="1000"/>
-            </a:lvl4pPr>
-            <a:lvl5pPr marL="1828800" indent="0">
-              <a:buNone/>
-              <a:defRPr sz="1000"/>
-            </a:lvl5pPr>
-            <a:lvl6pPr marL="2286000" indent="0">
-              <a:buNone/>
-              <a:defRPr sz="1000"/>
-            </a:lvl6pPr>
-            <a:lvl7pPr marL="2743200" indent="0">
-              <a:buNone/>
-              <a:defRPr sz="1000"/>
-            </a:lvl7pPr>
-            <a:lvl8pPr marL="3200400" indent="0">
-              <a:buNone/>
-              <a:defRPr sz="1000"/>
-            </a:lvl8pPr>
-            <a:lvl9pPr marL="3657600" indent="0">
-              <a:buNone/>
-              <a:defRPr sz="1000"/>
-            </a:lvl9pPr>
-          </a:lstStyle>
-          <a:p>
-            <a:pPr lvl="0"/>
-            <a:r>
-              <a:rPr lang="en-US"/>
-              <a:t>Click to edit Master text styles</a:t>
-            </a:r>
-          </a:p>
         </p:txBody>
       </p:sp>
       <p:sp>
@@ -2098,7 +2542,7 @@
           <a:p>
             <a:fld id="{D12CECE7-E485-8341-8DE4-4859C7E44F28}" type="datetimeFigureOut">
               <a:rPr lang="en-US" smtClean="0"/>
-              <a:t>3/18/24</a:t>
+              <a:t>3/19/24</a:t>
             </a:fld>
             <a:endParaRPr lang="en-US"/>
           </a:p>
@@ -2149,7 +2593,7 @@
     </p:spTree>
     <p:extLst>
       <p:ext uri="{BB962C8B-B14F-4D97-AF65-F5344CB8AC3E}">
-        <p14:creationId xmlns:p14="http://schemas.microsoft.com/office/powerpoint/2010/main" val="3951783258"/>
+        <p14:creationId xmlns:p14="http://schemas.microsoft.com/office/powerpoint/2010/main" val="1902577250"/>
       </p:ext>
     </p:extLst>
   </p:cSld>
@@ -2188,15 +2632,15 @@
         </p:nvSpPr>
         <p:spPr>
           <a:xfrm>
-            <a:off x="991891" y="457200"/>
-            <a:ext cx="4644443" cy="1600200"/>
+            <a:off x="1983782" y="914400"/>
+            <a:ext cx="9288886" cy="3200400"/>
           </a:xfrm>
         </p:spPr>
         <p:txBody>
           <a:bodyPr anchor="b"/>
           <a:lstStyle>
             <a:lvl1pPr>
-              <a:defRPr sz="3200"/>
+              <a:defRPr sz="6400"/>
             </a:lvl1pPr>
           </a:lstStyle>
           <a:p>
@@ -2220,8 +2664,8 @@
         </p:nvSpPr>
         <p:spPr>
           <a:xfrm>
-            <a:off x="6121966" y="987426"/>
-            <a:ext cx="7290108" cy="4873625"/>
+            <a:off x="12243932" y="1974851"/>
+            <a:ext cx="14580215" cy="9747250"/>
           </a:xfrm>
         </p:spPr>
         <p:txBody>
@@ -2229,107 +2673,107 @@
           <a:lstStyle>
             <a:lvl1pPr marL="0" indent="0">
               <a:buNone/>
+              <a:defRPr sz="6400"/>
+            </a:lvl1pPr>
+            <a:lvl2pPr marL="914400" indent="0">
+              <a:buNone/>
+              <a:defRPr sz="5600"/>
+            </a:lvl2pPr>
+            <a:lvl3pPr marL="1828800" indent="0">
+              <a:buNone/>
+              <a:defRPr sz="4800"/>
+            </a:lvl3pPr>
+            <a:lvl4pPr marL="2743200" indent="0">
+              <a:buNone/>
+              <a:defRPr sz="4000"/>
+            </a:lvl4pPr>
+            <a:lvl5pPr marL="3657600" indent="0">
+              <a:buNone/>
+              <a:defRPr sz="4000"/>
+            </a:lvl5pPr>
+            <a:lvl6pPr marL="4572000" indent="0">
+              <a:buNone/>
+              <a:defRPr sz="4000"/>
+            </a:lvl6pPr>
+            <a:lvl7pPr marL="5486400" indent="0">
+              <a:buNone/>
+              <a:defRPr sz="4000"/>
+            </a:lvl7pPr>
+            <a:lvl8pPr marL="6400800" indent="0">
+              <a:buNone/>
+              <a:defRPr sz="4000"/>
+            </a:lvl8pPr>
+            <a:lvl9pPr marL="7315200" indent="0">
+              <a:buNone/>
+              <a:defRPr sz="4000"/>
+            </a:lvl9pPr>
+          </a:lstStyle>
+          <a:p>
+            <a:r>
+              <a:rPr lang="en-US"/>
+              <a:t>Click icon to add picture</a:t>
+            </a:r>
+            <a:endParaRPr lang="en-US" dirty="0"/>
+          </a:p>
+        </p:txBody>
+      </p:sp>
+      <p:sp>
+        <p:nvSpPr>
+          <p:cNvPr id="4" name="Text Placeholder 3"/>
+          <p:cNvSpPr>
+            <a:spLocks noGrp="1"/>
+          </p:cNvSpPr>
+          <p:nvPr>
+            <p:ph type="body" sz="half" idx="2"/>
+          </p:nvPr>
+        </p:nvSpPr>
+        <p:spPr>
+          <a:xfrm>
+            <a:off x="1983782" y="4114800"/>
+            <a:ext cx="9288886" cy="7623176"/>
+          </a:xfrm>
+        </p:spPr>
+        <p:txBody>
+          <a:bodyPr/>
+          <a:lstStyle>
+            <a:lvl1pPr marL="0" indent="0">
+              <a:buNone/>
               <a:defRPr sz="3200"/>
             </a:lvl1pPr>
-            <a:lvl2pPr marL="457200" indent="0">
+            <a:lvl2pPr marL="914400" indent="0">
               <a:buNone/>
               <a:defRPr sz="2800"/>
             </a:lvl2pPr>
-            <a:lvl3pPr marL="914400" indent="0">
+            <a:lvl3pPr marL="1828800" indent="0">
               <a:buNone/>
               <a:defRPr sz="2400"/>
             </a:lvl3pPr>
-            <a:lvl4pPr marL="1371600" indent="0">
+            <a:lvl4pPr marL="2743200" indent="0">
               <a:buNone/>
               <a:defRPr sz="2000"/>
             </a:lvl4pPr>
-            <a:lvl5pPr marL="1828800" indent="0">
+            <a:lvl5pPr marL="3657600" indent="0">
               <a:buNone/>
               <a:defRPr sz="2000"/>
             </a:lvl5pPr>
-            <a:lvl6pPr marL="2286000" indent="0">
+            <a:lvl6pPr marL="4572000" indent="0">
               <a:buNone/>
               <a:defRPr sz="2000"/>
             </a:lvl6pPr>
-            <a:lvl7pPr marL="2743200" indent="0">
+            <a:lvl7pPr marL="5486400" indent="0">
               <a:buNone/>
               <a:defRPr sz="2000"/>
             </a:lvl7pPr>
-            <a:lvl8pPr marL="3200400" indent="0">
+            <a:lvl8pPr marL="6400800" indent="0">
               <a:buNone/>
               <a:defRPr sz="2000"/>
             </a:lvl8pPr>
-            <a:lvl9pPr marL="3657600" indent="0">
+            <a:lvl9pPr marL="7315200" indent="0">
               <a:buNone/>
               <a:defRPr sz="2000"/>
             </a:lvl9pPr>
           </a:lstStyle>
           <a:p>
-            <a:r>
-              <a:rPr lang="en-US"/>
-              <a:t>Click icon to add picture</a:t>
-            </a:r>
-            <a:endParaRPr lang="en-US" dirty="0"/>
-          </a:p>
-        </p:txBody>
-      </p:sp>
-      <p:sp>
-        <p:nvSpPr>
-          <p:cNvPr id="4" name="Text Placeholder 3"/>
-          <p:cNvSpPr>
-            <a:spLocks noGrp="1"/>
-          </p:cNvSpPr>
-          <p:nvPr>
-            <p:ph type="body" sz="half" idx="2"/>
-          </p:nvPr>
-        </p:nvSpPr>
-        <p:spPr>
-          <a:xfrm>
-            <a:off x="991891" y="2057400"/>
-            <a:ext cx="4644443" cy="3811588"/>
-          </a:xfrm>
-        </p:spPr>
-        <p:txBody>
-          <a:bodyPr/>
-          <a:lstStyle>
-            <a:lvl1pPr marL="0" indent="0">
-              <a:buNone/>
-              <a:defRPr sz="1600"/>
-            </a:lvl1pPr>
-            <a:lvl2pPr marL="457200" indent="0">
-              <a:buNone/>
-              <a:defRPr sz="1400"/>
-            </a:lvl2pPr>
-            <a:lvl3pPr marL="914400" indent="0">
-              <a:buNone/>
-              <a:defRPr sz="1200"/>
-            </a:lvl3pPr>
-            <a:lvl4pPr marL="1371600" indent="0">
-              <a:buNone/>
-              <a:defRPr sz="1000"/>
-            </a:lvl4pPr>
-            <a:lvl5pPr marL="1828800" indent="0">
-              <a:buNone/>
-              <a:defRPr sz="1000"/>
-            </a:lvl5pPr>
-            <a:lvl6pPr marL="2286000" indent="0">
-              <a:buNone/>
-              <a:defRPr sz="1000"/>
-            </a:lvl6pPr>
-            <a:lvl7pPr marL="2743200" indent="0">
-              <a:buNone/>
-              <a:defRPr sz="1000"/>
-            </a:lvl7pPr>
-            <a:lvl8pPr marL="3200400" indent="0">
-              <a:buNone/>
-              <a:defRPr sz="1000"/>
-            </a:lvl8pPr>
-            <a:lvl9pPr marL="3657600" indent="0">
-              <a:buNone/>
-              <a:defRPr sz="1000"/>
-            </a:lvl9pPr>
-          </a:lstStyle>
-          <a:p>
             <a:pPr lvl="0"/>
             <a:r>
               <a:rPr lang="en-US"/>
@@ -2355,7 +2799,7 @@
           <a:p>
             <a:fld id="{D12CECE7-E485-8341-8DE4-4859C7E44F28}" type="datetimeFigureOut">
               <a:rPr lang="en-US" smtClean="0"/>
-              <a:t>3/18/24</a:t>
+              <a:t>3/19/24</a:t>
             </a:fld>
             <a:endParaRPr lang="en-US"/>
           </a:p>
@@ -2406,7 +2850,7 @@
     </p:spTree>
     <p:extLst>
       <p:ext uri="{BB962C8B-B14F-4D97-AF65-F5344CB8AC3E}">
-        <p14:creationId xmlns:p14="http://schemas.microsoft.com/office/powerpoint/2010/main" val="170256044"/>
+        <p14:creationId xmlns:p14="http://schemas.microsoft.com/office/powerpoint/2010/main" val="2239670317"/>
       </p:ext>
     </p:extLst>
   </p:cSld>
@@ -2450,8 +2894,8 @@
         </p:nvSpPr>
         <p:spPr>
           <a:xfrm>
-            <a:off x="990015" y="365126"/>
-            <a:ext cx="12420184" cy="1325563"/>
+            <a:off x="1980029" y="730251"/>
+            <a:ext cx="24840367" cy="2651126"/>
           </a:xfrm>
           <a:prstGeom prst="rect">
             <a:avLst/>
@@ -2483,8 +2927,8 @@
         </p:nvSpPr>
         <p:spPr>
           <a:xfrm>
-            <a:off x="990015" y="1825625"/>
-            <a:ext cx="12420184" cy="4351338"/>
+            <a:off x="1980029" y="3651250"/>
+            <a:ext cx="24840367" cy="8702676"/>
           </a:xfrm>
           <a:prstGeom prst="rect">
             <a:avLst/>
@@ -2545,8 +2989,8 @@
         </p:nvSpPr>
         <p:spPr>
           <a:xfrm>
-            <a:off x="990015" y="6356351"/>
-            <a:ext cx="3240048" cy="365125"/>
+            <a:off x="1980030" y="12712701"/>
+            <a:ext cx="6480096" cy="730250"/>
           </a:xfrm>
           <a:prstGeom prst="rect">
             <a:avLst/>
@@ -2556,7 +3000,7 @@
           <a:bodyPr vert="horz" lIns="91440" tIns="45720" rIns="91440" bIns="45720" rtlCol="0" anchor="ctr"/>
           <a:lstStyle>
             <a:lvl1pPr algn="l">
-              <a:defRPr sz="1200">
+              <a:defRPr sz="2400">
                 <a:solidFill>
                   <a:schemeClr val="tx1">
                     <a:tint val="82000"/>
@@ -2568,7 +3012,7 @@
           <a:p>
             <a:fld id="{D12CECE7-E485-8341-8DE4-4859C7E44F28}" type="datetimeFigureOut">
               <a:rPr lang="en-US" smtClean="0"/>
-              <a:t>3/18/24</a:t>
+              <a:t>3/19/24</a:t>
             </a:fld>
             <a:endParaRPr lang="en-US"/>
           </a:p>
@@ -2586,8 +3030,8 @@
         </p:nvSpPr>
         <p:spPr>
           <a:xfrm>
-            <a:off x="4770071" y="6356351"/>
-            <a:ext cx="4860072" cy="365125"/>
+            <a:off x="9540143" y="12712701"/>
+            <a:ext cx="9720142" cy="730250"/>
           </a:xfrm>
           <a:prstGeom prst="rect">
             <a:avLst/>
@@ -2597,7 +3041,7 @@
           <a:bodyPr vert="horz" lIns="91440" tIns="45720" rIns="91440" bIns="45720" rtlCol="0" anchor="ctr"/>
           <a:lstStyle>
             <a:lvl1pPr algn="ctr">
-              <a:defRPr sz="1200">
+              <a:defRPr sz="2400">
                 <a:solidFill>
                   <a:schemeClr val="tx1">
                     <a:tint val="82000"/>
@@ -2623,8 +3067,8 @@
         </p:nvSpPr>
         <p:spPr>
           <a:xfrm>
-            <a:off x="10170150" y="6356351"/>
-            <a:ext cx="3240048" cy="365125"/>
+            <a:off x="20340300" y="12712701"/>
+            <a:ext cx="6480096" cy="730250"/>
           </a:xfrm>
           <a:prstGeom prst="rect">
             <a:avLst/>
@@ -2634,7 +3078,7 @@
           <a:bodyPr vert="horz" lIns="91440" tIns="45720" rIns="91440" bIns="45720" rtlCol="0" anchor="ctr"/>
           <a:lstStyle>
             <a:lvl1pPr algn="r">
-              <a:defRPr sz="1200">
+              <a:defRPr sz="2400">
                 <a:solidFill>
                   <a:schemeClr val="tx1">
                     <a:tint val="82000"/>
@@ -2655,27 +3099,27 @@
     </p:spTree>
     <p:extLst>
       <p:ext uri="{BB962C8B-B14F-4D97-AF65-F5344CB8AC3E}">
-        <p14:creationId xmlns:p14="http://schemas.microsoft.com/office/powerpoint/2010/main" val="4158601367"/>
+        <p14:creationId xmlns:p14="http://schemas.microsoft.com/office/powerpoint/2010/main" val="2848292821"/>
       </p:ext>
     </p:extLst>
   </p:cSld>
   <p:clrMap bg1="lt1" tx1="dk1" bg2="lt2" tx2="dk2" accent1="accent1" accent2="accent2" accent3="accent3" accent4="accent4" accent5="accent5" accent6="accent6" hlink="hlink" folHlink="folHlink"/>
   <p:sldLayoutIdLst>
-    <p:sldLayoutId id="2147483661" r:id="rId1"/>
-    <p:sldLayoutId id="2147483662" r:id="rId2"/>
-    <p:sldLayoutId id="2147483663" r:id="rId3"/>
-    <p:sldLayoutId id="2147483664" r:id="rId4"/>
-    <p:sldLayoutId id="2147483665" r:id="rId5"/>
-    <p:sldLayoutId id="2147483666" r:id="rId6"/>
-    <p:sldLayoutId id="2147483667" r:id="rId7"/>
-    <p:sldLayoutId id="2147483668" r:id="rId8"/>
-    <p:sldLayoutId id="2147483669" r:id="rId9"/>
-    <p:sldLayoutId id="2147483670" r:id="rId10"/>
-    <p:sldLayoutId id="2147483671" r:id="rId11"/>
+    <p:sldLayoutId id="2147483673" r:id="rId1"/>
+    <p:sldLayoutId id="2147483674" r:id="rId2"/>
+    <p:sldLayoutId id="2147483675" r:id="rId3"/>
+    <p:sldLayoutId id="2147483676" r:id="rId4"/>
+    <p:sldLayoutId id="2147483677" r:id="rId5"/>
+    <p:sldLayoutId id="2147483678" r:id="rId6"/>
+    <p:sldLayoutId id="2147483679" r:id="rId7"/>
+    <p:sldLayoutId id="2147483680" r:id="rId8"/>
+    <p:sldLayoutId id="2147483681" r:id="rId9"/>
+    <p:sldLayoutId id="2147483682" r:id="rId10"/>
+    <p:sldLayoutId id="2147483683" r:id="rId11"/>
   </p:sldLayoutIdLst>
   <p:txStyles>
     <p:titleStyle>
-      <a:lvl1pPr algn="l" defTabSz="914400" rtl="0" eaLnBrk="1" latinLnBrk="0" hangingPunct="1">
+      <a:lvl1pPr algn="l" defTabSz="1828800" rtl="0" eaLnBrk="1" latinLnBrk="0" hangingPunct="1">
         <a:lnSpc>
           <a:spcPct val="90000"/>
         </a:lnSpc>
@@ -2683,7 +3127,7 @@
           <a:spcPct val="0"/>
         </a:spcBef>
         <a:buNone/>
-        <a:defRPr sz="4400" kern="1200">
+        <a:defRPr sz="8800" kern="1200">
           <a:solidFill>
             <a:schemeClr val="tx1"/>
           </a:solidFill>
@@ -2694,7 +3138,25 @@
       </a:lvl1pPr>
     </p:titleStyle>
     <p:bodyStyle>
-      <a:lvl1pPr marL="228600" indent="-228600" algn="l" defTabSz="914400" rtl="0" eaLnBrk="1" latinLnBrk="0" hangingPunct="1">
+      <a:lvl1pPr marL="457200" indent="-457200" algn="l" defTabSz="1828800" rtl="0" eaLnBrk="1" latinLnBrk="0" hangingPunct="1">
+        <a:lnSpc>
+          <a:spcPct val="90000"/>
+        </a:lnSpc>
+        <a:spcBef>
+          <a:spcPts val="2000"/>
+        </a:spcBef>
+        <a:buFont typeface="Arial" panose="020B0604020202020204" pitchFamily="34" charset="0"/>
+        <a:buChar char="•"/>
+        <a:defRPr sz="5600" kern="1200">
+          <a:solidFill>
+            <a:schemeClr val="tx1"/>
+          </a:solidFill>
+          <a:latin typeface="+mn-lt"/>
+          <a:ea typeface="+mn-ea"/>
+          <a:cs typeface="+mn-cs"/>
+        </a:defRPr>
+      </a:lvl1pPr>
+      <a:lvl2pPr marL="1371600" indent="-457200" algn="l" defTabSz="1828800" rtl="0" eaLnBrk="1" latinLnBrk="0" hangingPunct="1">
         <a:lnSpc>
           <a:spcPct val="90000"/>
         </a:lnSpc>
@@ -2703,25 +3165,7 @@
         </a:spcBef>
         <a:buFont typeface="Arial" panose="020B0604020202020204" pitchFamily="34" charset="0"/>
         <a:buChar char="•"/>
-        <a:defRPr sz="2800" kern="1200">
-          <a:solidFill>
-            <a:schemeClr val="tx1"/>
-          </a:solidFill>
-          <a:latin typeface="+mn-lt"/>
-          <a:ea typeface="+mn-ea"/>
-          <a:cs typeface="+mn-cs"/>
-        </a:defRPr>
-      </a:lvl1pPr>
-      <a:lvl2pPr marL="685800" indent="-228600" algn="l" defTabSz="914400" rtl="0" eaLnBrk="1" latinLnBrk="0" hangingPunct="1">
-        <a:lnSpc>
-          <a:spcPct val="90000"/>
-        </a:lnSpc>
-        <a:spcBef>
-          <a:spcPts val="500"/>
-        </a:spcBef>
-        <a:buFont typeface="Arial" panose="020B0604020202020204" pitchFamily="34" charset="0"/>
-        <a:buChar char="•"/>
-        <a:defRPr sz="2400" kern="1200">
+        <a:defRPr sz="4800" kern="1200">
           <a:solidFill>
             <a:schemeClr val="tx1"/>
           </a:solidFill>
@@ -2730,16 +3174,16 @@
           <a:cs typeface="+mn-cs"/>
         </a:defRPr>
       </a:lvl2pPr>
-      <a:lvl3pPr marL="1143000" indent="-228600" algn="l" defTabSz="914400" rtl="0" eaLnBrk="1" latinLnBrk="0" hangingPunct="1">
+      <a:lvl3pPr marL="2286000" indent="-457200" algn="l" defTabSz="1828800" rtl="0" eaLnBrk="1" latinLnBrk="0" hangingPunct="1">
         <a:lnSpc>
           <a:spcPct val="90000"/>
         </a:lnSpc>
         <a:spcBef>
-          <a:spcPts val="500"/>
+          <a:spcPts val="1000"/>
         </a:spcBef>
         <a:buFont typeface="Arial" panose="020B0604020202020204" pitchFamily="34" charset="0"/>
         <a:buChar char="•"/>
-        <a:defRPr sz="2000" kern="1200">
+        <a:defRPr sz="4000" kern="1200">
           <a:solidFill>
             <a:schemeClr val="tx1"/>
           </a:solidFill>
@@ -2748,16 +3192,16 @@
           <a:cs typeface="+mn-cs"/>
         </a:defRPr>
       </a:lvl3pPr>
-      <a:lvl4pPr marL="1600200" indent="-228600" algn="l" defTabSz="914400" rtl="0" eaLnBrk="1" latinLnBrk="0" hangingPunct="1">
+      <a:lvl4pPr marL="3200400" indent="-457200" algn="l" defTabSz="1828800" rtl="0" eaLnBrk="1" latinLnBrk="0" hangingPunct="1">
         <a:lnSpc>
           <a:spcPct val="90000"/>
         </a:lnSpc>
         <a:spcBef>
-          <a:spcPts val="500"/>
+          <a:spcPts val="1000"/>
         </a:spcBef>
         <a:buFont typeface="Arial" panose="020B0604020202020204" pitchFamily="34" charset="0"/>
         <a:buChar char="•"/>
-        <a:defRPr sz="1800" kern="1200">
+        <a:defRPr sz="3600" kern="1200">
           <a:solidFill>
             <a:schemeClr val="tx1"/>
           </a:solidFill>
@@ -2766,16 +3210,16 @@
           <a:cs typeface="+mn-cs"/>
         </a:defRPr>
       </a:lvl4pPr>
-      <a:lvl5pPr marL="2057400" indent="-228600" algn="l" defTabSz="914400" rtl="0" eaLnBrk="1" latinLnBrk="0" hangingPunct="1">
+      <a:lvl5pPr marL="4114800" indent="-457200" algn="l" defTabSz="1828800" rtl="0" eaLnBrk="1" latinLnBrk="0" hangingPunct="1">
         <a:lnSpc>
           <a:spcPct val="90000"/>
         </a:lnSpc>
         <a:spcBef>
-          <a:spcPts val="500"/>
+          <a:spcPts val="1000"/>
         </a:spcBef>
         <a:buFont typeface="Arial" panose="020B0604020202020204" pitchFamily="34" charset="0"/>
         <a:buChar char="•"/>
-        <a:defRPr sz="1800" kern="1200">
+        <a:defRPr sz="3600" kern="1200">
           <a:solidFill>
             <a:schemeClr val="tx1"/>
           </a:solidFill>
@@ -2784,16 +3228,16 @@
           <a:cs typeface="+mn-cs"/>
         </a:defRPr>
       </a:lvl5pPr>
-      <a:lvl6pPr marL="2514600" indent="-228600" algn="l" defTabSz="914400" rtl="0" eaLnBrk="1" latinLnBrk="0" hangingPunct="1">
+      <a:lvl6pPr marL="5029200" indent="-457200" algn="l" defTabSz="1828800" rtl="0" eaLnBrk="1" latinLnBrk="0" hangingPunct="1">
         <a:lnSpc>
           <a:spcPct val="90000"/>
         </a:lnSpc>
         <a:spcBef>
-          <a:spcPts val="500"/>
+          <a:spcPts val="1000"/>
         </a:spcBef>
         <a:buFont typeface="Arial" panose="020B0604020202020204" pitchFamily="34" charset="0"/>
         <a:buChar char="•"/>
-        <a:defRPr sz="1800" kern="1200">
+        <a:defRPr sz="3600" kern="1200">
           <a:solidFill>
             <a:schemeClr val="tx1"/>
           </a:solidFill>
@@ -2802,16 +3246,16 @@
           <a:cs typeface="+mn-cs"/>
         </a:defRPr>
       </a:lvl6pPr>
-      <a:lvl7pPr marL="2971800" indent="-228600" algn="l" defTabSz="914400" rtl="0" eaLnBrk="1" latinLnBrk="0" hangingPunct="1">
+      <a:lvl7pPr marL="5943600" indent="-457200" algn="l" defTabSz="1828800" rtl="0" eaLnBrk="1" latinLnBrk="0" hangingPunct="1">
         <a:lnSpc>
           <a:spcPct val="90000"/>
         </a:lnSpc>
         <a:spcBef>
-          <a:spcPts val="500"/>
+          <a:spcPts val="1000"/>
         </a:spcBef>
         <a:buFont typeface="Arial" panose="020B0604020202020204" pitchFamily="34" charset="0"/>
         <a:buChar char="•"/>
-        <a:defRPr sz="1800" kern="1200">
+        <a:defRPr sz="3600" kern="1200">
           <a:solidFill>
             <a:schemeClr val="tx1"/>
           </a:solidFill>
@@ -2820,16 +3264,16 @@
           <a:cs typeface="+mn-cs"/>
         </a:defRPr>
       </a:lvl7pPr>
-      <a:lvl8pPr marL="3429000" indent="-228600" algn="l" defTabSz="914400" rtl="0" eaLnBrk="1" latinLnBrk="0" hangingPunct="1">
+      <a:lvl8pPr marL="6858000" indent="-457200" algn="l" defTabSz="1828800" rtl="0" eaLnBrk="1" latinLnBrk="0" hangingPunct="1">
         <a:lnSpc>
           <a:spcPct val="90000"/>
         </a:lnSpc>
         <a:spcBef>
-          <a:spcPts val="500"/>
+          <a:spcPts val="1000"/>
         </a:spcBef>
         <a:buFont typeface="Arial" panose="020B0604020202020204" pitchFamily="34" charset="0"/>
         <a:buChar char="•"/>
-        <a:defRPr sz="1800" kern="1200">
+        <a:defRPr sz="3600" kern="1200">
           <a:solidFill>
             <a:schemeClr val="tx1"/>
           </a:solidFill>
@@ -2838,16 +3282,16 @@
           <a:cs typeface="+mn-cs"/>
         </a:defRPr>
       </a:lvl8pPr>
-      <a:lvl9pPr marL="3886200" indent="-228600" algn="l" defTabSz="914400" rtl="0" eaLnBrk="1" latinLnBrk="0" hangingPunct="1">
+      <a:lvl9pPr marL="7772400" indent="-457200" algn="l" defTabSz="1828800" rtl="0" eaLnBrk="1" latinLnBrk="0" hangingPunct="1">
         <a:lnSpc>
           <a:spcPct val="90000"/>
         </a:lnSpc>
         <a:spcBef>
-          <a:spcPts val="500"/>
+          <a:spcPts val="1000"/>
         </a:spcBef>
         <a:buFont typeface="Arial" panose="020B0604020202020204" pitchFamily="34" charset="0"/>
         <a:buChar char="•"/>
-        <a:defRPr sz="1800" kern="1200">
+        <a:defRPr sz="3600" kern="1200">
           <a:solidFill>
             <a:schemeClr val="tx1"/>
           </a:solidFill>
@@ -2861,8 +3305,8 @@
       <a:defPPr>
         <a:defRPr lang="en-US"/>
       </a:defPPr>
-      <a:lvl1pPr marL="0" algn="l" defTabSz="914400" rtl="0" eaLnBrk="1" latinLnBrk="0" hangingPunct="1">
-        <a:defRPr sz="1800" kern="1200">
+      <a:lvl1pPr marL="0" algn="l" defTabSz="1828800" rtl="0" eaLnBrk="1" latinLnBrk="0" hangingPunct="1">
+        <a:defRPr sz="3600" kern="1200">
           <a:solidFill>
             <a:schemeClr val="tx1"/>
           </a:solidFill>
@@ -2871,8 +3315,8 @@
           <a:cs typeface="+mn-cs"/>
         </a:defRPr>
       </a:lvl1pPr>
-      <a:lvl2pPr marL="457200" algn="l" defTabSz="914400" rtl="0" eaLnBrk="1" latinLnBrk="0" hangingPunct="1">
-        <a:defRPr sz="1800" kern="1200">
+      <a:lvl2pPr marL="914400" algn="l" defTabSz="1828800" rtl="0" eaLnBrk="1" latinLnBrk="0" hangingPunct="1">
+        <a:defRPr sz="3600" kern="1200">
           <a:solidFill>
             <a:schemeClr val="tx1"/>
           </a:solidFill>
@@ -2881,8 +3325,8 @@
           <a:cs typeface="+mn-cs"/>
         </a:defRPr>
       </a:lvl2pPr>
-      <a:lvl3pPr marL="914400" algn="l" defTabSz="914400" rtl="0" eaLnBrk="1" latinLnBrk="0" hangingPunct="1">
-        <a:defRPr sz="1800" kern="1200">
+      <a:lvl3pPr marL="1828800" algn="l" defTabSz="1828800" rtl="0" eaLnBrk="1" latinLnBrk="0" hangingPunct="1">
+        <a:defRPr sz="3600" kern="1200">
           <a:solidFill>
             <a:schemeClr val="tx1"/>
           </a:solidFill>
@@ -2891,8 +3335,8 @@
           <a:cs typeface="+mn-cs"/>
         </a:defRPr>
       </a:lvl3pPr>
-      <a:lvl4pPr marL="1371600" algn="l" defTabSz="914400" rtl="0" eaLnBrk="1" latinLnBrk="0" hangingPunct="1">
-        <a:defRPr sz="1800" kern="1200">
+      <a:lvl4pPr marL="2743200" algn="l" defTabSz="1828800" rtl="0" eaLnBrk="1" latinLnBrk="0" hangingPunct="1">
+        <a:defRPr sz="3600" kern="1200">
           <a:solidFill>
             <a:schemeClr val="tx1"/>
           </a:solidFill>
@@ -2901,8 +3345,8 @@
           <a:cs typeface="+mn-cs"/>
         </a:defRPr>
       </a:lvl4pPr>
-      <a:lvl5pPr marL="1828800" algn="l" defTabSz="914400" rtl="0" eaLnBrk="1" latinLnBrk="0" hangingPunct="1">
-        <a:defRPr sz="1800" kern="1200">
+      <a:lvl5pPr marL="3657600" algn="l" defTabSz="1828800" rtl="0" eaLnBrk="1" latinLnBrk="0" hangingPunct="1">
+        <a:defRPr sz="3600" kern="1200">
           <a:solidFill>
             <a:schemeClr val="tx1"/>
           </a:solidFill>
@@ -2911,8 +3355,8 @@
           <a:cs typeface="+mn-cs"/>
         </a:defRPr>
       </a:lvl5pPr>
-      <a:lvl6pPr marL="2286000" algn="l" defTabSz="914400" rtl="0" eaLnBrk="1" latinLnBrk="0" hangingPunct="1">
-        <a:defRPr sz="1800" kern="1200">
+      <a:lvl6pPr marL="4572000" algn="l" defTabSz="1828800" rtl="0" eaLnBrk="1" latinLnBrk="0" hangingPunct="1">
+        <a:defRPr sz="3600" kern="1200">
           <a:solidFill>
             <a:schemeClr val="tx1"/>
           </a:solidFill>
@@ -2921,8 +3365,8 @@
           <a:cs typeface="+mn-cs"/>
         </a:defRPr>
       </a:lvl6pPr>
-      <a:lvl7pPr marL="2743200" algn="l" defTabSz="914400" rtl="0" eaLnBrk="1" latinLnBrk="0" hangingPunct="1">
-        <a:defRPr sz="1800" kern="1200">
+      <a:lvl7pPr marL="5486400" algn="l" defTabSz="1828800" rtl="0" eaLnBrk="1" latinLnBrk="0" hangingPunct="1">
+        <a:defRPr sz="3600" kern="1200">
           <a:solidFill>
             <a:schemeClr val="tx1"/>
           </a:solidFill>
@@ -2931,8 +3375,8 @@
           <a:cs typeface="+mn-cs"/>
         </a:defRPr>
       </a:lvl7pPr>
-      <a:lvl8pPr marL="3200400" algn="l" defTabSz="914400" rtl="0" eaLnBrk="1" latinLnBrk="0" hangingPunct="1">
-        <a:defRPr sz="1800" kern="1200">
+      <a:lvl8pPr marL="6400800" algn="l" defTabSz="1828800" rtl="0" eaLnBrk="1" latinLnBrk="0" hangingPunct="1">
+        <a:defRPr sz="3600" kern="1200">
           <a:solidFill>
             <a:schemeClr val="tx1"/>
           </a:solidFill>
@@ -2941,8 +3385,8 @@
           <a:cs typeface="+mn-cs"/>
         </a:defRPr>
       </a:lvl8pPr>
-      <a:lvl9pPr marL="3657600" algn="l" defTabSz="914400" rtl="0" eaLnBrk="1" latinLnBrk="0" hangingPunct="1">
-        <a:defRPr sz="1800" kern="1200">
+      <a:lvl9pPr marL="7315200" algn="l" defTabSz="1828800" rtl="0" eaLnBrk="1" latinLnBrk="0" hangingPunct="1">
+        <a:defRPr sz="3600" kern="1200">
           <a:solidFill>
             <a:schemeClr val="tx1"/>
           </a:solidFill>
@@ -2975,10 +3419,10 @@
       </p:grpSpPr>
       <p:grpSp>
         <p:nvGrpSpPr>
-          <p:cNvPr id="2" name="Group 1">
+          <p:cNvPr id="6" name="Group 5">
             <a:extLst>
               <a:ext uri="{FF2B5EF4-FFF2-40B4-BE49-F238E27FC236}">
-                <a16:creationId xmlns:a16="http://schemas.microsoft.com/office/drawing/2014/main" id="{FB71F31A-56EC-DF83-8F3C-DB3C10896066}"/>
+                <a16:creationId xmlns:a16="http://schemas.microsoft.com/office/drawing/2014/main" id="{3FDEDCD6-A808-6573-2FEB-49554D127630}"/>
               </a:ext>
             </a:extLst>
           </p:cNvPr>
@@ -2987,38 +3431,578 @@
         </p:nvGrpSpPr>
         <p:grpSpPr>
           <a:xfrm>
-            <a:off x="480342" y="802484"/>
-            <a:ext cx="13439529" cy="5234894"/>
-            <a:chOff x="480342" y="802484"/>
-            <a:chExt cx="13439529" cy="5234894"/>
+            <a:off x="923093" y="3266996"/>
+            <a:ext cx="27234810" cy="7083403"/>
+            <a:chOff x="923093" y="3266996"/>
+            <a:chExt cx="27234810" cy="7083403"/>
           </a:xfrm>
         </p:grpSpPr>
         <p:grpSp>
           <p:nvGrpSpPr>
-            <p:cNvPr id="24" name="Group 23">
+            <p:cNvPr id="2" name="Group 1">
               <a:extLst>
                 <a:ext uri="{FF2B5EF4-FFF2-40B4-BE49-F238E27FC236}">
-                  <a16:creationId xmlns:a16="http://schemas.microsoft.com/office/drawing/2014/main" id="{A8159254-8A4B-EA97-C6D3-3A08884AE6A5}"/>
+                  <a16:creationId xmlns:a16="http://schemas.microsoft.com/office/drawing/2014/main" id="{FB71F31A-56EC-DF83-8F3C-DB3C10896066}"/>
                 </a:ext>
               </a:extLst>
             </p:cNvPr>
-            <p:cNvGrpSpPr/>
+            <p:cNvGrpSpPr>
+              <a:grpSpLocks noChangeAspect="1"/>
+            </p:cNvGrpSpPr>
             <p:nvPr/>
           </p:nvGrpSpPr>
           <p:grpSpPr>
             <a:xfrm>
-              <a:off x="480342" y="802484"/>
-              <a:ext cx="4986997" cy="5234894"/>
-              <a:chOff x="1217175" y="-210899"/>
-              <a:chExt cx="3145411" cy="3301765"/>
+              <a:off x="923093" y="3365600"/>
+              <a:ext cx="17932056" cy="6984799"/>
+              <a:chOff x="480342" y="802484"/>
+              <a:chExt cx="13439532" cy="5234894"/>
             </a:xfrm>
           </p:grpSpPr>
+          <p:grpSp>
+            <p:nvGrpSpPr>
+              <p:cNvPr id="24" name="Group 23">
+                <a:extLst>
+                  <a:ext uri="{FF2B5EF4-FFF2-40B4-BE49-F238E27FC236}">
+                    <a16:creationId xmlns:a16="http://schemas.microsoft.com/office/drawing/2014/main" id="{A8159254-8A4B-EA97-C6D3-3A08884AE6A5}"/>
+                  </a:ext>
+                </a:extLst>
+              </p:cNvPr>
+              <p:cNvGrpSpPr/>
+              <p:nvPr/>
+            </p:nvGrpSpPr>
+            <p:grpSpPr>
+              <a:xfrm>
+                <a:off x="480342" y="802484"/>
+                <a:ext cx="5692700" cy="5234894"/>
+                <a:chOff x="1217175" y="-210899"/>
+                <a:chExt cx="3590513" cy="3301765"/>
+              </a:xfrm>
+            </p:grpSpPr>
+            <p:pic>
+              <p:nvPicPr>
+                <p:cNvPr id="5" name="Graphic 4">
+                  <a:extLst>
+                    <a:ext uri="{FF2B5EF4-FFF2-40B4-BE49-F238E27FC236}">
+                      <a16:creationId xmlns:a16="http://schemas.microsoft.com/office/drawing/2014/main" id="{3D75D7AA-6329-1599-E71B-7E795A9B65BB}"/>
+                    </a:ext>
+                  </a:extLst>
+                </p:cNvPr>
+                <p:cNvPicPr>
+                  <a:picLocks noChangeAspect="1"/>
+                </p:cNvPicPr>
+                <p:nvPr/>
+              </p:nvPicPr>
+              <p:blipFill>
+                <a:blip r:embed="rId3"/>
+                <a:srcRect/>
+                <a:stretch/>
+              </p:blipFill>
+              <p:spPr>
+                <a:xfrm>
+                  <a:off x="1217175" y="563666"/>
+                  <a:ext cx="1677140" cy="2527200"/>
+                </a:xfrm>
+                <a:prstGeom prst="rect">
+                  <a:avLst/>
+                </a:prstGeom>
+              </p:spPr>
+            </p:pic>
+            <p:sp>
+              <p:nvSpPr>
+                <p:cNvPr id="8" name="Rounded Rectangular Callout 7">
+                  <a:extLst>
+                    <a:ext uri="{FF2B5EF4-FFF2-40B4-BE49-F238E27FC236}">
+                      <a16:creationId xmlns:a16="http://schemas.microsoft.com/office/drawing/2014/main" id="{BFA9B2A9-74A5-B2BC-8437-E222CB7C1899}"/>
+                    </a:ext>
+                  </a:extLst>
+                </p:cNvPr>
+                <p:cNvSpPr/>
+                <p:nvPr/>
+              </p:nvSpPr>
+              <p:spPr>
+                <a:xfrm>
+                  <a:off x="1455816" y="-210899"/>
+                  <a:ext cx="1383481" cy="917936"/>
+                </a:xfrm>
+                <a:prstGeom prst="wedgeRoundRectCallout">
+                  <a:avLst>
+                    <a:gd name="adj1" fmla="val 4518"/>
+                    <a:gd name="adj2" fmla="val 88720"/>
+                    <a:gd name="adj3" fmla="val 16667"/>
+                  </a:avLst>
+                </a:prstGeom>
+                <a:noFill/>
+                <a:ln>
+                  <a:solidFill>
+                    <a:schemeClr val="tx1"/>
+                  </a:solidFill>
+                </a:ln>
+              </p:spPr>
+              <p:style>
+                <a:lnRef idx="2">
+                  <a:schemeClr val="accent1">
+                    <a:shade val="15000"/>
+                  </a:schemeClr>
+                </a:lnRef>
+                <a:fillRef idx="1">
+                  <a:schemeClr val="accent1"/>
+                </a:fillRef>
+                <a:effectRef idx="0">
+                  <a:schemeClr val="accent1"/>
+                </a:effectRef>
+                <a:fontRef idx="minor">
+                  <a:schemeClr val="lt1"/>
+                </a:fontRef>
+              </p:style>
+              <p:txBody>
+                <a:bodyPr rtlCol="0" anchor="ctr"/>
+                <a:lstStyle/>
+                <a:p>
+                  <a:pPr algn="ctr"/>
+                  <a:r>
+                    <a:rPr lang="en-US" sz="3600" dirty="0">
+                      <a:solidFill>
+                        <a:schemeClr val="tx1"/>
+                      </a:solidFill>
+                      <a:latin typeface="Raleway" pitchFamily="2" charset="77"/>
+                    </a:rPr>
+                    <a:t>Is </a:t>
+                  </a:r>
+                  <a:r>
+                    <a:rPr lang="en-US" sz="3600" b="1" dirty="0">
+                      <a:solidFill>
+                        <a:schemeClr val="tx1"/>
+                      </a:solidFill>
+                      <a:latin typeface="Raleway" pitchFamily="2" charset="77"/>
+                    </a:rPr>
+                    <a:t>[entity] made of stuff</a:t>
+                  </a:r>
+                  <a:r>
+                    <a:rPr lang="en-US" sz="3600" dirty="0">
+                      <a:solidFill>
+                        <a:schemeClr val="tx1"/>
+                      </a:solidFill>
+                      <a:latin typeface="Raleway" pitchFamily="2" charset="77"/>
+                    </a:rPr>
+                    <a:t>?</a:t>
+                  </a:r>
+                </a:p>
+              </p:txBody>
+            </p:sp>
+            <p:sp>
+              <p:nvSpPr>
+                <p:cNvPr id="9" name="Rounded Rectangular Callout 8">
+                  <a:extLst>
+                    <a:ext uri="{FF2B5EF4-FFF2-40B4-BE49-F238E27FC236}">
+                      <a16:creationId xmlns:a16="http://schemas.microsoft.com/office/drawing/2014/main" id="{01604D85-1354-19B8-D428-043D53601981}"/>
+                    </a:ext>
+                  </a:extLst>
+                </p:cNvPr>
+                <p:cNvSpPr/>
+                <p:nvPr/>
+              </p:nvSpPr>
+              <p:spPr>
+                <a:xfrm>
+                  <a:off x="2968340" y="363680"/>
+                  <a:ext cx="1601289" cy="917936"/>
+                </a:xfrm>
+                <a:prstGeom prst="wedgeRoundRectCallout">
+                  <a:avLst>
+                    <a:gd name="adj1" fmla="val -68837"/>
+                    <a:gd name="adj2" fmla="val 67718"/>
+                    <a:gd name="adj3" fmla="val 16667"/>
+                  </a:avLst>
+                </a:prstGeom>
+                <a:noFill/>
+                <a:ln>
+                  <a:solidFill>
+                    <a:schemeClr val="tx1"/>
+                  </a:solidFill>
+                </a:ln>
+              </p:spPr>
+              <p:style>
+                <a:lnRef idx="2">
+                  <a:schemeClr val="accent1">
+                    <a:shade val="15000"/>
+                  </a:schemeClr>
+                </a:lnRef>
+                <a:fillRef idx="1">
+                  <a:schemeClr val="accent1"/>
+                </a:fillRef>
+                <a:effectRef idx="0">
+                  <a:schemeClr val="accent1"/>
+                </a:effectRef>
+                <a:fontRef idx="minor">
+                  <a:schemeClr val="lt1"/>
+                </a:fontRef>
+              </p:style>
+              <p:txBody>
+                <a:bodyPr rtlCol="0" anchor="ctr"/>
+                <a:lstStyle/>
+                <a:p>
+                  <a:pPr algn="ctr"/>
+                  <a:r>
+                    <a:rPr lang="en-US" sz="3600" dirty="0">
+                      <a:solidFill>
+                        <a:schemeClr val="tx1"/>
+                      </a:solidFill>
+                      <a:latin typeface="Raleway" pitchFamily="2" charset="77"/>
+                    </a:rPr>
+                    <a:t>Does </a:t>
+                  </a:r>
+                  <a:r>
+                    <a:rPr lang="en-US" sz="3600" b="1" dirty="0">
+                      <a:solidFill>
+                        <a:schemeClr val="tx1"/>
+                      </a:solidFill>
+                      <a:latin typeface="Raleway" pitchFamily="2" charset="77"/>
+                    </a:rPr>
+                    <a:t>[entity] take up space</a:t>
+                  </a:r>
+                  <a:r>
+                    <a:rPr lang="en-US" sz="3600" dirty="0">
+                      <a:solidFill>
+                        <a:schemeClr val="tx1"/>
+                      </a:solidFill>
+                      <a:latin typeface="Raleway" pitchFamily="2" charset="77"/>
+                    </a:rPr>
+                    <a:t>?</a:t>
+                  </a:r>
+                </a:p>
+              </p:txBody>
+            </p:sp>
+            <p:sp>
+              <p:nvSpPr>
+                <p:cNvPr id="14" name="Rounded Rectangular Callout 13">
+                  <a:extLst>
+                    <a:ext uri="{FF2B5EF4-FFF2-40B4-BE49-F238E27FC236}">
+                      <a16:creationId xmlns:a16="http://schemas.microsoft.com/office/drawing/2014/main" id="{62D383DA-E41A-A80B-A491-1271BCB90587}"/>
+                    </a:ext>
+                  </a:extLst>
+                </p:cNvPr>
+                <p:cNvSpPr/>
+                <p:nvPr/>
+              </p:nvSpPr>
+              <p:spPr>
+                <a:xfrm>
+                  <a:off x="3003922" y="1450892"/>
+                  <a:ext cx="1803766" cy="1315008"/>
+                </a:xfrm>
+                <a:prstGeom prst="wedgeRoundRectCallout">
+                  <a:avLst>
+                    <a:gd name="adj1" fmla="val -76078"/>
+                    <a:gd name="adj2" fmla="val 5522"/>
+                    <a:gd name="adj3" fmla="val 16667"/>
+                  </a:avLst>
+                </a:prstGeom>
+                <a:noFill/>
+                <a:ln>
+                  <a:solidFill>
+                    <a:schemeClr val="tx1"/>
+                  </a:solidFill>
+                </a:ln>
+              </p:spPr>
+              <p:style>
+                <a:lnRef idx="2">
+                  <a:schemeClr val="accent1">
+                    <a:shade val="15000"/>
+                  </a:schemeClr>
+                </a:lnRef>
+                <a:fillRef idx="1">
+                  <a:schemeClr val="accent1"/>
+                </a:fillRef>
+                <a:effectRef idx="0">
+                  <a:schemeClr val="accent1"/>
+                </a:effectRef>
+                <a:fontRef idx="minor">
+                  <a:schemeClr val="lt1"/>
+                </a:fontRef>
+              </p:style>
+              <p:txBody>
+                <a:bodyPr rtlCol="0" anchor="ctr"/>
+                <a:lstStyle/>
+                <a:p>
+                  <a:pPr algn="ctr"/>
+                  <a:r>
+                    <a:rPr lang="en-US" sz="3600" dirty="0">
+                      <a:solidFill>
+                        <a:schemeClr val="tx1"/>
+                      </a:solidFill>
+                      <a:latin typeface="Raleway" pitchFamily="2" charset="77"/>
+                    </a:rPr>
+                    <a:t>Does </a:t>
+                  </a:r>
+                  <a:r>
+                    <a:rPr lang="en-US" sz="3600" b="1" dirty="0">
+                      <a:solidFill>
+                        <a:schemeClr val="tx1"/>
+                      </a:solidFill>
+                      <a:latin typeface="Raleway" pitchFamily="2" charset="77"/>
+                    </a:rPr>
+                    <a:t>[entity] weigh anything </a:t>
+                  </a:r>
+                  <a:r>
+                    <a:rPr lang="en-US" sz="3600" dirty="0">
+                      <a:solidFill>
+                        <a:schemeClr val="tx1"/>
+                      </a:solidFill>
+                      <a:latin typeface="Raleway" pitchFamily="2" charset="77"/>
+                    </a:rPr>
+                    <a:t>at all?</a:t>
+                  </a:r>
+                </a:p>
+              </p:txBody>
+            </p:sp>
+          </p:grpSp>
+          <p:grpSp>
+            <p:nvGrpSpPr>
+              <p:cNvPr id="23" name="Group 22">
+                <a:extLst>
+                  <a:ext uri="{FF2B5EF4-FFF2-40B4-BE49-F238E27FC236}">
+                    <a16:creationId xmlns:a16="http://schemas.microsoft.com/office/drawing/2014/main" id="{800C770B-13CA-6D1B-F29E-383D74E0BD8A}"/>
+                  </a:ext>
+                </a:extLst>
+              </p:cNvPr>
+              <p:cNvGrpSpPr/>
+              <p:nvPr/>
+            </p:nvGrpSpPr>
+            <p:grpSpPr>
+              <a:xfrm>
+                <a:off x="10779706" y="2129496"/>
+                <a:ext cx="3140168" cy="3392653"/>
+                <a:chOff x="5282094" y="569706"/>
+                <a:chExt cx="1980574" cy="2139822"/>
+              </a:xfrm>
+            </p:grpSpPr>
+            <p:sp>
+              <p:nvSpPr>
+                <p:cNvPr id="10" name="Rounded Rectangular Callout 9">
+                  <a:extLst>
+                    <a:ext uri="{FF2B5EF4-FFF2-40B4-BE49-F238E27FC236}">
+                      <a16:creationId xmlns:a16="http://schemas.microsoft.com/office/drawing/2014/main" id="{118F938F-3C92-CCB2-BF8E-E41C18EDA2A9}"/>
+                    </a:ext>
+                  </a:extLst>
+                </p:cNvPr>
+                <p:cNvSpPr/>
+                <p:nvPr/>
+              </p:nvSpPr>
+              <p:spPr>
+                <a:xfrm>
+                  <a:off x="5282094" y="1206341"/>
+                  <a:ext cx="813906" cy="555956"/>
+                </a:xfrm>
+                <a:prstGeom prst="wedgeRoundRectCallout">
+                  <a:avLst>
+                    <a:gd name="adj1" fmla="val 92231"/>
+                    <a:gd name="adj2" fmla="val 31502"/>
+                    <a:gd name="adj3" fmla="val 16667"/>
+                  </a:avLst>
+                </a:prstGeom>
+                <a:noFill/>
+                <a:ln>
+                  <a:solidFill>
+                    <a:schemeClr val="tx1"/>
+                  </a:solidFill>
+                </a:ln>
+              </p:spPr>
+              <p:style>
+                <a:lnRef idx="2">
+                  <a:schemeClr val="accent1">
+                    <a:shade val="15000"/>
+                  </a:schemeClr>
+                </a:lnRef>
+                <a:fillRef idx="1">
+                  <a:schemeClr val="accent1"/>
+                </a:fillRef>
+                <a:effectRef idx="0">
+                  <a:schemeClr val="accent1"/>
+                </a:effectRef>
+                <a:fontRef idx="minor">
+                  <a:schemeClr val="lt1"/>
+                </a:fontRef>
+              </p:style>
+              <p:txBody>
+                <a:bodyPr rtlCol="0" anchor="ctr"/>
+                <a:lstStyle/>
+                <a:p>
+                  <a:pPr algn="ctr"/>
+                  <a:r>
+                    <a:rPr lang="en-US" sz="3600" dirty="0">
+                      <a:solidFill>
+                        <a:schemeClr val="tx1"/>
+                      </a:solidFill>
+                      <a:latin typeface="Raleway" pitchFamily="2" charset="77"/>
+                    </a:rPr>
+                    <a:t>Yes!</a:t>
+                  </a:r>
+                </a:p>
+              </p:txBody>
+            </p:sp>
+            <p:sp>
+              <p:nvSpPr>
+                <p:cNvPr id="11" name="Rounded Rectangular Callout 10">
+                  <a:extLst>
+                    <a:ext uri="{FF2B5EF4-FFF2-40B4-BE49-F238E27FC236}">
+                      <a16:creationId xmlns:a16="http://schemas.microsoft.com/office/drawing/2014/main" id="{78DEA5E3-0502-BA0E-ED19-453B5E0E06B9}"/>
+                    </a:ext>
+                  </a:extLst>
+                </p:cNvPr>
+                <p:cNvSpPr/>
+                <p:nvPr/>
+              </p:nvSpPr>
+              <p:spPr>
+                <a:xfrm>
+                  <a:off x="5689047" y="569706"/>
+                  <a:ext cx="813906" cy="555956"/>
+                </a:xfrm>
+                <a:prstGeom prst="wedgeRoundRectCallout">
+                  <a:avLst>
+                    <a:gd name="adj1" fmla="val 46431"/>
+                    <a:gd name="adj2" fmla="val 107719"/>
+                    <a:gd name="adj3" fmla="val 16667"/>
+                  </a:avLst>
+                </a:prstGeom>
+                <a:noFill/>
+                <a:ln>
+                  <a:solidFill>
+                    <a:schemeClr val="tx1"/>
+                  </a:solidFill>
+                </a:ln>
+              </p:spPr>
+              <p:style>
+                <a:lnRef idx="2">
+                  <a:schemeClr val="accent1">
+                    <a:shade val="15000"/>
+                  </a:schemeClr>
+                </a:lnRef>
+                <a:fillRef idx="1">
+                  <a:schemeClr val="accent1"/>
+                </a:fillRef>
+                <a:effectRef idx="0">
+                  <a:schemeClr val="accent1"/>
+                </a:effectRef>
+                <a:fontRef idx="minor">
+                  <a:schemeClr val="lt1"/>
+                </a:fontRef>
+              </p:style>
+              <p:txBody>
+                <a:bodyPr rtlCol="0" anchor="ctr"/>
+                <a:lstStyle/>
+                <a:p>
+                  <a:pPr algn="ctr"/>
+                  <a:r>
+                    <a:rPr lang="en-US" sz="3600" dirty="0">
+                      <a:solidFill>
+                        <a:schemeClr val="tx1"/>
+                      </a:solidFill>
+                      <a:latin typeface="Raleway" pitchFamily="2" charset="77"/>
+                    </a:rPr>
+                    <a:t>No!</a:t>
+                  </a:r>
+                </a:p>
+              </p:txBody>
+            </p:sp>
+            <p:sp>
+              <p:nvSpPr>
+                <p:cNvPr id="12" name="Rounded Rectangular Callout 11">
+                  <a:extLst>
+                    <a:ext uri="{FF2B5EF4-FFF2-40B4-BE49-F238E27FC236}">
+                      <a16:creationId xmlns:a16="http://schemas.microsoft.com/office/drawing/2014/main" id="{CAC29257-39FE-6F97-4310-21ACA150574B}"/>
+                    </a:ext>
+                  </a:extLst>
+                </p:cNvPr>
+                <p:cNvSpPr/>
+                <p:nvPr/>
+              </p:nvSpPr>
+              <p:spPr>
+                <a:xfrm>
+                  <a:off x="5282094" y="1977075"/>
+                  <a:ext cx="949884" cy="663088"/>
+                </a:xfrm>
+                <a:prstGeom prst="wedgeRoundRectCallout">
+                  <a:avLst>
+                    <a:gd name="adj1" fmla="val 57409"/>
+                    <a:gd name="adj2" fmla="val -72449"/>
+                    <a:gd name="adj3" fmla="val 16667"/>
+                  </a:avLst>
+                </a:prstGeom>
+                <a:noFill/>
+                <a:ln>
+                  <a:solidFill>
+                    <a:schemeClr val="tx1"/>
+                  </a:solidFill>
+                </a:ln>
+              </p:spPr>
+              <p:style>
+                <a:lnRef idx="2">
+                  <a:schemeClr val="accent1">
+                    <a:shade val="15000"/>
+                  </a:schemeClr>
+                </a:lnRef>
+                <a:fillRef idx="1">
+                  <a:schemeClr val="accent1"/>
+                </a:fillRef>
+                <a:effectRef idx="0">
+                  <a:schemeClr val="accent1"/>
+                </a:effectRef>
+                <a:fontRef idx="minor">
+                  <a:schemeClr val="lt1"/>
+                </a:fontRef>
+              </p:style>
+              <p:txBody>
+                <a:bodyPr rtlCol="0" anchor="ctr"/>
+                <a:lstStyle/>
+                <a:p>
+                  <a:pPr algn="ctr"/>
+                  <a:r>
+                    <a:rPr lang="en-US" sz="3600" dirty="0">
+                      <a:solidFill>
+                        <a:schemeClr val="tx1"/>
+                      </a:solidFill>
+                      <a:latin typeface="Raleway" pitchFamily="2" charset="77"/>
+                    </a:rPr>
+                    <a:t>I don’t know!</a:t>
+                  </a:r>
+                </a:p>
+              </p:txBody>
+            </p:sp>
+            <p:pic>
+              <p:nvPicPr>
+                <p:cNvPr id="18" name="Graphic 17">
+                  <a:extLst>
+                    <a:ext uri="{FF2B5EF4-FFF2-40B4-BE49-F238E27FC236}">
+                      <a16:creationId xmlns:a16="http://schemas.microsoft.com/office/drawing/2014/main" id="{0C34915B-51CF-79A8-0EBF-3979E1635428}"/>
+                    </a:ext>
+                  </a:extLst>
+                </p:cNvPr>
+                <p:cNvPicPr>
+                  <a:picLocks noChangeAspect="1"/>
+                </p:cNvPicPr>
+                <p:nvPr/>
+              </p:nvPicPr>
+              <p:blipFill>
+                <a:blip r:embed="rId4"/>
+                <a:srcRect/>
+                <a:stretch/>
+              </p:blipFill>
+              <p:spPr>
+                <a:xfrm>
+                  <a:off x="6071123" y="1046330"/>
+                  <a:ext cx="1191545" cy="1663198"/>
+                </a:xfrm>
+                <a:prstGeom prst="rect">
+                  <a:avLst/>
+                </a:prstGeom>
+              </p:spPr>
+            </p:pic>
+          </p:grpSp>
           <p:pic>
             <p:nvPicPr>
-              <p:cNvPr id="5" name="Graphic 4">
+              <p:cNvPr id="3" name="Graphic 2" descr="Stopwatch with solid fill">
                 <a:extLst>
                   <a:ext uri="{FF2B5EF4-FFF2-40B4-BE49-F238E27FC236}">
-                    <a16:creationId xmlns:a16="http://schemas.microsoft.com/office/drawing/2014/main" id="{3D75D7AA-6329-1599-E71B-7E795A9B65BB}"/>
+                    <a16:creationId xmlns:a16="http://schemas.microsoft.com/office/drawing/2014/main" id="{573812E7-E914-ECBB-127D-094287A37EB6}"/>
                   </a:ext>
                 </a:extLst>
               </p:cNvPr>
@@ -3028,14 +4012,21 @@
               <p:nvPr/>
             </p:nvPicPr>
             <p:blipFill>
-              <a:blip r:embed="rId2"/>
-              <a:srcRect/>
-              <a:stretch/>
+              <a:blip r:embed="rId5">
+                <a:extLst>
+                  <a:ext uri="{96DAC541-7B7A-43D3-8B79-37D633B846F1}">
+                    <asvg:svgBlip xmlns:asvg="http://schemas.microsoft.com/office/drawing/2016/SVG/main" r:embed="rId6"/>
+                  </a:ext>
+                </a:extLst>
+              </a:blip>
+              <a:stretch>
+                <a:fillRect/>
+              </a:stretch>
             </p:blipFill>
             <p:spPr>
               <a:xfrm>
-                <a:off x="1217175" y="563666"/>
-                <a:ext cx="1677140" cy="2527200"/>
+                <a:off x="7831157" y="2123143"/>
+                <a:ext cx="1290435" cy="1290435"/>
               </a:xfrm>
               <a:prstGeom prst="rect">
                 <a:avLst/>
@@ -3044,10 +4035,10 @@
           </p:pic>
           <p:sp>
             <p:nvSpPr>
-              <p:cNvPr id="8" name="Rounded Rectangular Callout 7">
+              <p:cNvPr id="4" name="Rounded Rectangle 3">
                 <a:extLst>
                   <a:ext uri="{FF2B5EF4-FFF2-40B4-BE49-F238E27FC236}">
-                    <a16:creationId xmlns:a16="http://schemas.microsoft.com/office/drawing/2014/main" id="{BFA9B2A9-74A5-B2BC-8437-E222CB7C1899}"/>
+                    <a16:creationId xmlns:a16="http://schemas.microsoft.com/office/drawing/2014/main" id="{E49E72C6-17A3-A344-06C3-BB04B07D459D}"/>
                   </a:ext>
                 </a:extLst>
               </p:cNvPr>
@@ -3056,17 +4047,20 @@
             </p:nvSpPr>
             <p:spPr>
               <a:xfrm>
-                <a:off x="1561517" y="-210899"/>
-                <a:ext cx="1277780" cy="917936"/>
+                <a:off x="7454334" y="3492298"/>
+                <a:ext cx="2044080" cy="881459"/>
               </a:xfrm>
-              <a:prstGeom prst="wedgeRoundRectCallout">
-                <a:avLst>
-                  <a:gd name="adj1" fmla="val 4518"/>
-                  <a:gd name="adj2" fmla="val 88720"/>
-                  <a:gd name="adj3" fmla="val 16667"/>
-                </a:avLst>
+              <a:prstGeom prst="roundRect">
+                <a:avLst/>
               </a:prstGeom>
-              <a:noFill/>
+              <a:solidFill>
+                <a:schemeClr val="tx1"/>
+              </a:solidFill>
+              <a:ln>
+                <a:solidFill>
+                  <a:schemeClr val="tx1"/>
+                </a:solidFill>
+              </a:ln>
             </p:spPr>
             <p:style>
               <a:lnRef idx="2">
@@ -3090,459 +4084,19 @@
               <a:p>
                 <a:pPr algn="ctr"/>
                 <a:r>
-                  <a:rPr lang="en-US" sz="2400" dirty="0">
-                    <a:solidFill>
-                      <a:schemeClr val="tx1"/>
-                    </a:solidFill>
-                    <a:latin typeface="Raleway" pitchFamily="2" charset="77"/>
-                  </a:rPr>
-                  <a:t>Are cats </a:t>
-                </a:r>
-                <a:r>
-                  <a:rPr lang="en-US" sz="2400" b="1" dirty="0">
-                    <a:solidFill>
-                      <a:schemeClr val="tx1"/>
-                    </a:solidFill>
-                    <a:latin typeface="Raleway" pitchFamily="2" charset="77"/>
-                  </a:rPr>
-                  <a:t>made of stuff</a:t>
-                </a:r>
-                <a:r>
-                  <a:rPr lang="en-US" sz="2400" dirty="0">
-                    <a:solidFill>
-                      <a:schemeClr val="tx1"/>
-                    </a:solidFill>
-                    <a:latin typeface="Raleway" pitchFamily="2" charset="77"/>
-                  </a:rPr>
-                  <a:t>?</a:t>
-                </a:r>
-              </a:p>
-            </p:txBody>
-          </p:sp>
-          <p:sp>
-            <p:nvSpPr>
-              <p:cNvPr id="9" name="Rounded Rectangular Callout 8">
-                <a:extLst>
-                  <a:ext uri="{FF2B5EF4-FFF2-40B4-BE49-F238E27FC236}">
-                    <a16:creationId xmlns:a16="http://schemas.microsoft.com/office/drawing/2014/main" id="{01604D85-1354-19B8-D428-043D53601981}"/>
-                  </a:ext>
-                </a:extLst>
-              </p:cNvPr>
-              <p:cNvSpPr/>
-              <p:nvPr/>
-            </p:nvSpPr>
-            <p:spPr>
-              <a:xfrm>
-                <a:off x="2968340" y="363680"/>
-                <a:ext cx="1236000" cy="917936"/>
-              </a:xfrm>
-              <a:prstGeom prst="wedgeRoundRectCallout">
-                <a:avLst>
-                  <a:gd name="adj1" fmla="val -68837"/>
-                  <a:gd name="adj2" fmla="val 67718"/>
-                  <a:gd name="adj3" fmla="val 16667"/>
-                </a:avLst>
-              </a:prstGeom>
-              <a:noFill/>
-            </p:spPr>
-            <p:style>
-              <a:lnRef idx="2">
-                <a:schemeClr val="accent1">
-                  <a:shade val="15000"/>
-                </a:schemeClr>
-              </a:lnRef>
-              <a:fillRef idx="1">
-                <a:schemeClr val="accent1"/>
-              </a:fillRef>
-              <a:effectRef idx="0">
-                <a:schemeClr val="accent1"/>
-              </a:effectRef>
-              <a:fontRef idx="minor">
-                <a:schemeClr val="lt1"/>
-              </a:fontRef>
-            </p:style>
-            <p:txBody>
-              <a:bodyPr rtlCol="0" anchor="ctr"/>
-              <a:lstStyle/>
-              <a:p>
-                <a:pPr algn="ctr"/>
-                <a:r>
-                  <a:rPr lang="en-US" sz="2400" dirty="0">
-                    <a:solidFill>
-                      <a:schemeClr val="tx1"/>
-                    </a:solidFill>
-                    <a:latin typeface="Raleway" pitchFamily="2" charset="77"/>
-                  </a:rPr>
-                  <a:t>Do cats </a:t>
-                </a:r>
-                <a:r>
-                  <a:rPr lang="en-US" sz="2400" b="1" dirty="0">
-                    <a:solidFill>
-                      <a:schemeClr val="tx1"/>
-                    </a:solidFill>
-                    <a:latin typeface="Raleway" pitchFamily="2" charset="77"/>
-                  </a:rPr>
-                  <a:t>take up space</a:t>
-                </a:r>
-                <a:r>
-                  <a:rPr lang="en-US" sz="2400" dirty="0">
-                    <a:solidFill>
-                      <a:schemeClr val="tx1"/>
-                    </a:solidFill>
-                    <a:latin typeface="Raleway" pitchFamily="2" charset="77"/>
-                  </a:rPr>
-                  <a:t>?</a:t>
-                </a:r>
-              </a:p>
-            </p:txBody>
-          </p:sp>
-          <p:sp>
-            <p:nvSpPr>
-              <p:cNvPr id="14" name="Rounded Rectangular Callout 13">
-                <a:extLst>
-                  <a:ext uri="{FF2B5EF4-FFF2-40B4-BE49-F238E27FC236}">
-                    <a16:creationId xmlns:a16="http://schemas.microsoft.com/office/drawing/2014/main" id="{62D383DA-E41A-A80B-A491-1271BCB90587}"/>
-                  </a:ext>
-                </a:extLst>
-              </p:cNvPr>
-              <p:cNvSpPr/>
-              <p:nvPr/>
-            </p:nvSpPr>
-            <p:spPr>
-              <a:xfrm>
-                <a:off x="3003922" y="1450892"/>
-                <a:ext cx="1358664" cy="1177957"/>
-              </a:xfrm>
-              <a:prstGeom prst="wedgeRoundRectCallout">
-                <a:avLst>
-                  <a:gd name="adj1" fmla="val -76078"/>
-                  <a:gd name="adj2" fmla="val 5522"/>
-                  <a:gd name="adj3" fmla="val 16667"/>
-                </a:avLst>
-              </a:prstGeom>
-              <a:noFill/>
-            </p:spPr>
-            <p:style>
-              <a:lnRef idx="2">
-                <a:schemeClr val="accent1">
-                  <a:shade val="15000"/>
-                </a:schemeClr>
-              </a:lnRef>
-              <a:fillRef idx="1">
-                <a:schemeClr val="accent1"/>
-              </a:fillRef>
-              <a:effectRef idx="0">
-                <a:schemeClr val="accent1"/>
-              </a:effectRef>
-              <a:fontRef idx="minor">
-                <a:schemeClr val="lt1"/>
-              </a:fontRef>
-            </p:style>
-            <p:txBody>
-              <a:bodyPr rtlCol="0" anchor="ctr"/>
-              <a:lstStyle/>
-              <a:p>
-                <a:pPr algn="ctr"/>
-                <a:r>
-                  <a:rPr lang="en-US" sz="2400" dirty="0">
-                    <a:solidFill>
-                      <a:schemeClr val="tx1"/>
-                    </a:solidFill>
-                    <a:latin typeface="Raleway" pitchFamily="2" charset="77"/>
-                  </a:rPr>
-                  <a:t>Do cats </a:t>
-                </a:r>
-                <a:r>
-                  <a:rPr lang="en-US" sz="2400" b="1" dirty="0">
-                    <a:solidFill>
-                      <a:schemeClr val="tx1"/>
-                    </a:solidFill>
-                    <a:latin typeface="Raleway" pitchFamily="2" charset="77"/>
-                  </a:rPr>
-                  <a:t>weigh anything </a:t>
-                </a:r>
-                <a:r>
-                  <a:rPr lang="en-US" sz="2400" dirty="0">
-                    <a:solidFill>
-                      <a:schemeClr val="tx1"/>
-                    </a:solidFill>
-                    <a:latin typeface="Raleway" pitchFamily="2" charset="77"/>
-                  </a:rPr>
-                  <a:t>at all?</a:t>
+                  <a:rPr lang="en-US" sz="3600" dirty="0"/>
+                  <a:t>Response time (RT)</a:t>
                 </a:r>
               </a:p>
             </p:txBody>
           </p:sp>
         </p:grpSp>
-        <p:grpSp>
-          <p:nvGrpSpPr>
-            <p:cNvPr id="23" name="Group 22">
+        <p:sp>
+          <p:nvSpPr>
+            <p:cNvPr id="21" name="Rounded Rectangle 20">
               <a:extLst>
                 <a:ext uri="{FF2B5EF4-FFF2-40B4-BE49-F238E27FC236}">
-                  <a16:creationId xmlns:a16="http://schemas.microsoft.com/office/drawing/2014/main" id="{800C770B-13CA-6D1B-F29E-383D74E0BD8A}"/>
-                </a:ext>
-              </a:extLst>
-            </p:cNvPr>
-            <p:cNvGrpSpPr/>
-            <p:nvPr/>
-          </p:nvGrpSpPr>
-          <p:grpSpPr>
-            <a:xfrm>
-              <a:off x="10779704" y="2129496"/>
-              <a:ext cx="3140167" cy="3392653"/>
-              <a:chOff x="5282094" y="569706"/>
-              <a:chExt cx="1980574" cy="2139822"/>
-            </a:xfrm>
-          </p:grpSpPr>
-          <p:sp>
-            <p:nvSpPr>
-              <p:cNvPr id="10" name="Rounded Rectangular Callout 9">
-                <a:extLst>
-                  <a:ext uri="{FF2B5EF4-FFF2-40B4-BE49-F238E27FC236}">
-                    <a16:creationId xmlns:a16="http://schemas.microsoft.com/office/drawing/2014/main" id="{118F938F-3C92-CCB2-BF8E-E41C18EDA2A9}"/>
-                  </a:ext>
-                </a:extLst>
-              </p:cNvPr>
-              <p:cNvSpPr/>
-              <p:nvPr/>
-            </p:nvSpPr>
-            <p:spPr>
-              <a:xfrm>
-                <a:off x="5282094" y="1206341"/>
-                <a:ext cx="813906" cy="555956"/>
-              </a:xfrm>
-              <a:prstGeom prst="wedgeRoundRectCallout">
-                <a:avLst>
-                  <a:gd name="adj1" fmla="val 92231"/>
-                  <a:gd name="adj2" fmla="val 31502"/>
-                  <a:gd name="adj3" fmla="val 16667"/>
-                </a:avLst>
-              </a:prstGeom>
-              <a:noFill/>
-            </p:spPr>
-            <p:style>
-              <a:lnRef idx="2">
-                <a:schemeClr val="accent1">
-                  <a:shade val="15000"/>
-                </a:schemeClr>
-              </a:lnRef>
-              <a:fillRef idx="1">
-                <a:schemeClr val="accent1"/>
-              </a:fillRef>
-              <a:effectRef idx="0">
-                <a:schemeClr val="accent1"/>
-              </a:effectRef>
-              <a:fontRef idx="minor">
-                <a:schemeClr val="lt1"/>
-              </a:fontRef>
-            </p:style>
-            <p:txBody>
-              <a:bodyPr rtlCol="0" anchor="ctr"/>
-              <a:lstStyle/>
-              <a:p>
-                <a:pPr algn="ctr"/>
-                <a:r>
-                  <a:rPr lang="en-US" sz="2400" dirty="0">
-                    <a:solidFill>
-                      <a:schemeClr val="tx1"/>
-                    </a:solidFill>
-                    <a:latin typeface="Raleway" pitchFamily="2" charset="77"/>
-                  </a:rPr>
-                  <a:t>Yes!</a:t>
-                </a:r>
-              </a:p>
-            </p:txBody>
-          </p:sp>
-          <p:sp>
-            <p:nvSpPr>
-              <p:cNvPr id="11" name="Rounded Rectangular Callout 10">
-                <a:extLst>
-                  <a:ext uri="{FF2B5EF4-FFF2-40B4-BE49-F238E27FC236}">
-                    <a16:creationId xmlns:a16="http://schemas.microsoft.com/office/drawing/2014/main" id="{78DEA5E3-0502-BA0E-ED19-453B5E0E06B9}"/>
-                  </a:ext>
-                </a:extLst>
-              </p:cNvPr>
-              <p:cNvSpPr/>
-              <p:nvPr/>
-            </p:nvSpPr>
-            <p:spPr>
-              <a:xfrm>
-                <a:off x="5689047" y="569706"/>
-                <a:ext cx="813906" cy="555956"/>
-              </a:xfrm>
-              <a:prstGeom prst="wedgeRoundRectCallout">
-                <a:avLst>
-                  <a:gd name="adj1" fmla="val 46431"/>
-                  <a:gd name="adj2" fmla="val 107719"/>
-                  <a:gd name="adj3" fmla="val 16667"/>
-                </a:avLst>
-              </a:prstGeom>
-              <a:noFill/>
-            </p:spPr>
-            <p:style>
-              <a:lnRef idx="2">
-                <a:schemeClr val="accent1">
-                  <a:shade val="15000"/>
-                </a:schemeClr>
-              </a:lnRef>
-              <a:fillRef idx="1">
-                <a:schemeClr val="accent1"/>
-              </a:fillRef>
-              <a:effectRef idx="0">
-                <a:schemeClr val="accent1"/>
-              </a:effectRef>
-              <a:fontRef idx="minor">
-                <a:schemeClr val="lt1"/>
-              </a:fontRef>
-            </p:style>
-            <p:txBody>
-              <a:bodyPr rtlCol="0" anchor="ctr"/>
-              <a:lstStyle/>
-              <a:p>
-                <a:pPr algn="ctr"/>
-                <a:r>
-                  <a:rPr lang="en-US" sz="2400" dirty="0">
-                    <a:solidFill>
-                      <a:schemeClr val="tx1"/>
-                    </a:solidFill>
-                    <a:latin typeface="Raleway" pitchFamily="2" charset="77"/>
-                  </a:rPr>
-                  <a:t>No!</a:t>
-                </a:r>
-              </a:p>
-            </p:txBody>
-          </p:sp>
-          <p:sp>
-            <p:nvSpPr>
-              <p:cNvPr id="12" name="Rounded Rectangular Callout 11">
-                <a:extLst>
-                  <a:ext uri="{FF2B5EF4-FFF2-40B4-BE49-F238E27FC236}">
-                    <a16:creationId xmlns:a16="http://schemas.microsoft.com/office/drawing/2014/main" id="{CAC29257-39FE-6F97-4310-21ACA150574B}"/>
-                  </a:ext>
-                </a:extLst>
-              </p:cNvPr>
-              <p:cNvSpPr/>
-              <p:nvPr/>
-            </p:nvSpPr>
-            <p:spPr>
-              <a:xfrm>
-                <a:off x="5282094" y="1977075"/>
-                <a:ext cx="949884" cy="663088"/>
-              </a:xfrm>
-              <a:prstGeom prst="wedgeRoundRectCallout">
-                <a:avLst>
-                  <a:gd name="adj1" fmla="val 57409"/>
-                  <a:gd name="adj2" fmla="val -72449"/>
-                  <a:gd name="adj3" fmla="val 16667"/>
-                </a:avLst>
-              </a:prstGeom>
-              <a:noFill/>
-            </p:spPr>
-            <p:style>
-              <a:lnRef idx="2">
-                <a:schemeClr val="accent1">
-                  <a:shade val="15000"/>
-                </a:schemeClr>
-              </a:lnRef>
-              <a:fillRef idx="1">
-                <a:schemeClr val="accent1"/>
-              </a:fillRef>
-              <a:effectRef idx="0">
-                <a:schemeClr val="accent1"/>
-              </a:effectRef>
-              <a:fontRef idx="minor">
-                <a:schemeClr val="lt1"/>
-              </a:fontRef>
-            </p:style>
-            <p:txBody>
-              <a:bodyPr rtlCol="0" anchor="ctr"/>
-              <a:lstStyle/>
-              <a:p>
-                <a:pPr algn="ctr"/>
-                <a:r>
-                  <a:rPr lang="en-US" sz="2400" dirty="0">
-                    <a:solidFill>
-                      <a:schemeClr val="tx1"/>
-                    </a:solidFill>
-                    <a:latin typeface="Raleway" pitchFamily="2" charset="77"/>
-                  </a:rPr>
-                  <a:t>I don’t know!</a:t>
-                </a:r>
-              </a:p>
-            </p:txBody>
-          </p:sp>
-          <p:pic>
-            <p:nvPicPr>
-              <p:cNvPr id="18" name="Graphic 17">
-                <a:extLst>
-                  <a:ext uri="{FF2B5EF4-FFF2-40B4-BE49-F238E27FC236}">
-                    <a16:creationId xmlns:a16="http://schemas.microsoft.com/office/drawing/2014/main" id="{0C34915B-51CF-79A8-0EBF-3979E1635428}"/>
-                  </a:ext>
-                </a:extLst>
-              </p:cNvPr>
-              <p:cNvPicPr>
-                <a:picLocks noChangeAspect="1"/>
-              </p:cNvPicPr>
-              <p:nvPr/>
-            </p:nvPicPr>
-            <p:blipFill>
-              <a:blip r:embed="rId3"/>
-              <a:srcRect/>
-              <a:stretch/>
-            </p:blipFill>
-            <p:spPr>
-              <a:xfrm>
-                <a:off x="6071123" y="1046330"/>
-                <a:ext cx="1191545" cy="1663198"/>
-              </a:xfrm>
-              <a:prstGeom prst="rect">
-                <a:avLst/>
-              </a:prstGeom>
-            </p:spPr>
-          </p:pic>
-        </p:grpSp>
-        <p:pic>
-          <p:nvPicPr>
-            <p:cNvPr id="3" name="Graphic 2" descr="Stopwatch with solid fill">
-              <a:extLst>
-                <a:ext uri="{FF2B5EF4-FFF2-40B4-BE49-F238E27FC236}">
-                  <a16:creationId xmlns:a16="http://schemas.microsoft.com/office/drawing/2014/main" id="{573812E7-E914-ECBB-127D-094287A37EB6}"/>
-                </a:ext>
-              </a:extLst>
-            </p:cNvPr>
-            <p:cNvPicPr>
-              <a:picLocks noChangeAspect="1"/>
-            </p:cNvPicPr>
-            <p:nvPr/>
-          </p:nvPicPr>
-          <p:blipFill>
-            <a:blip r:embed="rId4">
-              <a:extLst>
-                <a:ext uri="{96DAC541-7B7A-43D3-8B79-37D633B846F1}">
-                  <asvg:svgBlip xmlns:asvg="http://schemas.microsoft.com/office/drawing/2016/SVG/main" r:embed="rId5"/>
-                </a:ext>
-              </a:extLst>
-            </a:blip>
-            <a:stretch>
-              <a:fillRect/>
-            </a:stretch>
-          </p:blipFill>
-          <p:spPr>
-            <a:xfrm>
-              <a:off x="7478303" y="2129496"/>
-              <a:ext cx="1290435" cy="1290435"/>
-            </a:xfrm>
-            <a:prstGeom prst="rect">
-              <a:avLst/>
-            </a:prstGeom>
-          </p:spPr>
-        </p:pic>
-        <p:sp>
-          <p:nvSpPr>
-            <p:cNvPr id="4" name="Rounded Rectangle 3">
-              <a:extLst>
-                <a:ext uri="{FF2B5EF4-FFF2-40B4-BE49-F238E27FC236}">
-                  <a16:creationId xmlns:a16="http://schemas.microsoft.com/office/drawing/2014/main" id="{E49E72C6-17A3-A344-06C3-BB04B07D459D}"/>
+                  <a16:creationId xmlns:a16="http://schemas.microsoft.com/office/drawing/2014/main" id="{1D34C554-1CA9-6C0F-A3A3-3C0FF13ED7B4}"/>
                 </a:ext>
               </a:extLst>
             </p:cNvPr>
@@ -3551,16 +4105,124 @@
           </p:nvSpPr>
           <p:spPr>
             <a:xfrm>
-              <a:off x="7101481" y="3498651"/>
-              <a:ext cx="2044080" cy="881459"/>
+              <a:off x="20812717" y="3266996"/>
+              <a:ext cx="7336991" cy="3183080"/>
             </a:xfrm>
             <a:prstGeom prst="roundRect">
               <a:avLst/>
             </a:prstGeom>
-            <a:solidFill>
-              <a:schemeClr val="tx1"/>
-            </a:solidFill>
-            <a:ln>
+            <a:noFill/>
+            <a:ln w="57150">
+              <a:solidFill>
+                <a:srgbClr val="80111A"/>
+              </a:solidFill>
+            </a:ln>
+          </p:spPr>
+          <p:style>
+            <a:lnRef idx="2">
+              <a:schemeClr val="accent1">
+                <a:shade val="15000"/>
+              </a:schemeClr>
+            </a:lnRef>
+            <a:fillRef idx="1">
+              <a:schemeClr val="accent1"/>
+            </a:fillRef>
+            <a:effectRef idx="0">
+              <a:schemeClr val="accent1"/>
+            </a:effectRef>
+            <a:fontRef idx="minor">
+              <a:schemeClr val="lt1"/>
+            </a:fontRef>
+          </p:style>
+          <p:txBody>
+            <a:bodyPr rtlCol="0" anchor="ctr"/>
+            <a:lstStyle/>
+            <a:p>
+              <a:pPr algn="ctr"/>
+              <a:endParaRPr lang="en-US"/>
+            </a:p>
+          </p:txBody>
+        </p:sp>
+        <p:sp>
+          <p:nvSpPr>
+            <p:cNvPr id="22" name="TextBox 21">
+              <a:extLst>
+                <a:ext uri="{FF2B5EF4-FFF2-40B4-BE49-F238E27FC236}">
+                  <a16:creationId xmlns:a16="http://schemas.microsoft.com/office/drawing/2014/main" id="{B14D41D4-DF95-2B47-236C-D39A2EA1786A}"/>
+                </a:ext>
+              </a:extLst>
+            </p:cNvPr>
+            <p:cNvSpPr txBox="1"/>
+            <p:nvPr/>
+          </p:nvSpPr>
+          <p:spPr>
+            <a:xfrm>
+              <a:off x="21085088" y="3428150"/>
+              <a:ext cx="6792244" cy="1077218"/>
+            </a:xfrm>
+            <a:prstGeom prst="rect">
+              <a:avLst/>
+            </a:prstGeom>
+            <a:noFill/>
+          </p:spPr>
+          <p:txBody>
+            <a:bodyPr wrap="none" rtlCol="0">
+              <a:spAutoFit/>
+            </a:bodyPr>
+            <a:lstStyle/>
+            <a:p>
+              <a:pPr algn="ctr"/>
+              <a:r>
+                <a:rPr lang="en-US" sz="3200" b="1" dirty="0">
+                  <a:solidFill>
+                    <a:srgbClr val="80111A"/>
+                  </a:solidFill>
+                  <a:latin typeface="Raleway" pitchFamily="2" charset="77"/>
+                </a:rPr>
+                <a:t>Incongruent</a:t>
+              </a:r>
+              <a:br>
+                <a:rPr lang="en-US" sz="3200" b="1" dirty="0">
+                  <a:solidFill>
+                    <a:srgbClr val="80111A"/>
+                  </a:solidFill>
+                  <a:latin typeface="Raleway" pitchFamily="2" charset="77"/>
+                </a:rPr>
+              </a:br>
+              <a:r>
+                <a:rPr lang="en-US" sz="3200" b="1" dirty="0">
+                  <a:solidFill>
+                    <a:srgbClr val="80111A"/>
+                  </a:solidFill>
+                  <a:latin typeface="Raleway" pitchFamily="2" charset="77"/>
+                </a:rPr>
+                <a:t>(Naïve answer ≠ scientific answer)</a:t>
+              </a:r>
+            </a:p>
+          </p:txBody>
+        </p:sp>
+        <p:sp>
+          <p:nvSpPr>
+            <p:cNvPr id="25" name="Rounded Rectangle 24">
+              <a:extLst>
+                <a:ext uri="{FF2B5EF4-FFF2-40B4-BE49-F238E27FC236}">
+                  <a16:creationId xmlns:a16="http://schemas.microsoft.com/office/drawing/2014/main" id="{C91AF14F-E9F2-1B75-CADD-2F7F0F285858}"/>
+                </a:ext>
+              </a:extLst>
+            </p:cNvPr>
+            <p:cNvSpPr/>
+            <p:nvPr/>
+          </p:nvSpPr>
+          <p:spPr>
+            <a:xfrm>
+              <a:off x="20820912" y="7167319"/>
+              <a:ext cx="7336991" cy="3183080"/>
+            </a:xfrm>
+            <a:prstGeom prst="roundRect">
+              <a:avLst/>
+            </a:prstGeom>
+            <a:noFill/>
+            <a:ln w="57150">
               <a:solidFill>
                 <a:schemeClr val="tx1"/>
               </a:solidFill>
@@ -3587,58 +4249,275 @@
             <a:lstStyle/>
             <a:p>
               <a:pPr algn="ctr"/>
+              <a:endParaRPr lang="en-US"/>
+            </a:p>
+          </p:txBody>
+        </p:sp>
+        <p:sp>
+          <p:nvSpPr>
+            <p:cNvPr id="26" name="TextBox 25">
+              <a:extLst>
+                <a:ext uri="{FF2B5EF4-FFF2-40B4-BE49-F238E27FC236}">
+                  <a16:creationId xmlns:a16="http://schemas.microsoft.com/office/drawing/2014/main" id="{B1C940B5-1FEF-116F-354A-8B62C04309E5}"/>
+                </a:ext>
+              </a:extLst>
+            </p:cNvPr>
+            <p:cNvSpPr txBox="1"/>
+            <p:nvPr/>
+          </p:nvSpPr>
+          <p:spPr>
+            <a:xfrm>
+              <a:off x="21085088" y="7349125"/>
+              <a:ext cx="6792244" cy="1077218"/>
+            </a:xfrm>
+            <a:prstGeom prst="rect">
+              <a:avLst/>
+            </a:prstGeom>
+            <a:noFill/>
+          </p:spPr>
+          <p:txBody>
+            <a:bodyPr wrap="none" rtlCol="0">
+              <a:spAutoFit/>
+            </a:bodyPr>
+            <a:lstStyle/>
+            <a:p>
+              <a:pPr algn="ctr"/>
               <a:r>
-                <a:rPr lang="en-US" sz="2400" dirty="0"/>
-                <a:t>Response time (RT)</a:t>
+                <a:rPr lang="en-US" sz="3200" b="1" dirty="0">
+                  <a:latin typeface="Raleway" pitchFamily="2" charset="77"/>
+                </a:rPr>
+                <a:t>Congruent</a:t>
+              </a:r>
+              <a:br>
+                <a:rPr lang="en-US" sz="3200" b="1" dirty="0">
+                  <a:latin typeface="Raleway" pitchFamily="2" charset="77"/>
+                </a:rPr>
+              </a:br>
+              <a:r>
+                <a:rPr lang="en-US" sz="3200" b="1" dirty="0">
+                  <a:latin typeface="Raleway" pitchFamily="2" charset="77"/>
+                </a:rPr>
+                <a:t>(Naïve answer = scientific answer)</a:t>
               </a:r>
             </a:p>
           </p:txBody>
         </p:sp>
-        <p:cxnSp>
-          <p:nvCxnSpPr>
-            <p:cNvPr id="7" name="Straight Arrow Connector 6">
+        <p:pic>
+          <p:nvPicPr>
+            <p:cNvPr id="27" name="Graphic 26" descr="Cat with solid fill">
               <a:extLst>
                 <a:ext uri="{FF2B5EF4-FFF2-40B4-BE49-F238E27FC236}">
-                  <a16:creationId xmlns:a16="http://schemas.microsoft.com/office/drawing/2014/main" id="{40565C05-49C0-FE12-C1B4-D9EF1D7FF220}"/>
+                  <a16:creationId xmlns:a16="http://schemas.microsoft.com/office/drawing/2014/main" id="{9780B9C8-850F-529F-C926-4B16D5382151}"/>
                 </a:ext>
               </a:extLst>
             </p:cNvPr>
-            <p:cNvCxnSpPr>
-              <a:cxnSpLocks/>
-            </p:cNvCxnSpPr>
+            <p:cNvPicPr>
+              <a:picLocks noChangeAspect="1"/>
+            </p:cNvPicPr>
             <p:nvPr/>
-          </p:nvCxnSpPr>
+          </p:nvPicPr>
+          <p:blipFill>
+            <a:blip r:embed="rId7">
+              <a:extLst>
+                <a:ext uri="{96DAC541-7B7A-43D3-8B79-37D633B846F1}">
+                  <asvg:svgBlip xmlns:asvg="http://schemas.microsoft.com/office/drawing/2016/SVG/main" r:embed="rId8"/>
+                </a:ext>
+              </a:extLst>
+            </a:blip>
+            <a:stretch>
+              <a:fillRect/>
+            </a:stretch>
+          </p:blipFill>
           <p:spPr>
             <a:xfrm>
-              <a:off x="7102190" y="1925128"/>
-              <a:ext cx="2043371" cy="0"/>
+              <a:off x="23904797" y="8447051"/>
+              <a:ext cx="1393069" cy="1393069"/>
             </a:xfrm>
-            <a:prstGeom prst="straightConnector1">
+            <a:prstGeom prst="rect">
               <a:avLst/>
             </a:prstGeom>
-            <a:ln w="38100">
-              <a:solidFill>
-                <a:schemeClr val="tx1"/>
-              </a:solidFill>
-              <a:headEnd type="triangle"/>
-              <a:tailEnd type="triangle"/>
-            </a:ln>
           </p:spPr>
-          <p:style>
-            <a:lnRef idx="2">
-              <a:schemeClr val="accent1"/>
-            </a:lnRef>
-            <a:fillRef idx="0">
-              <a:schemeClr val="accent1"/>
-            </a:fillRef>
-            <a:effectRef idx="1">
-              <a:schemeClr val="accent1"/>
-            </a:effectRef>
-            <a:fontRef idx="minor">
-              <a:schemeClr val="tx1"/>
-            </a:fontRef>
-          </p:style>
-        </p:cxnSp>
+        </p:pic>
+        <p:pic>
+          <p:nvPicPr>
+            <p:cNvPr id="28" name="Graphic 27" descr="Stacked Rocks with solid fill">
+              <a:extLst>
+                <a:ext uri="{FF2B5EF4-FFF2-40B4-BE49-F238E27FC236}">
+                  <a16:creationId xmlns:a16="http://schemas.microsoft.com/office/drawing/2014/main" id="{8CC3503D-AC09-67F0-E2D8-75E058053855}"/>
+                </a:ext>
+              </a:extLst>
+            </p:cNvPr>
+            <p:cNvPicPr>
+              <a:picLocks noChangeAspect="1"/>
+            </p:cNvPicPr>
+            <p:nvPr/>
+          </p:nvPicPr>
+          <p:blipFill>
+            <a:blip r:embed="rId9">
+              <a:extLst>
+                <a:ext uri="{96DAC541-7B7A-43D3-8B79-37D633B846F1}">
+                  <asvg:svgBlip xmlns:asvg="http://schemas.microsoft.com/office/drawing/2016/SVG/main" r:embed="rId10"/>
+                </a:ext>
+              </a:extLst>
+            </a:blip>
+            <a:stretch>
+              <a:fillRect/>
+            </a:stretch>
+          </p:blipFill>
+          <p:spPr>
+            <a:xfrm>
+              <a:off x="21666320" y="8447051"/>
+              <a:ext cx="1393069" cy="1393069"/>
+            </a:xfrm>
+            <a:prstGeom prst="rect">
+              <a:avLst/>
+            </a:prstGeom>
+          </p:spPr>
+        </p:pic>
+        <p:pic>
+          <p:nvPicPr>
+            <p:cNvPr id="29" name="Graphic 28" descr="Thought with solid fill">
+              <a:extLst>
+                <a:ext uri="{FF2B5EF4-FFF2-40B4-BE49-F238E27FC236}">
+                  <a16:creationId xmlns:a16="http://schemas.microsoft.com/office/drawing/2014/main" id="{081E421F-4B63-2DCF-71D0-5D2C19F545AA}"/>
+                </a:ext>
+              </a:extLst>
+            </p:cNvPr>
+            <p:cNvPicPr>
+              <a:picLocks noChangeAspect="1"/>
+            </p:cNvPicPr>
+            <p:nvPr/>
+          </p:nvPicPr>
+          <p:blipFill>
+            <a:blip r:embed="rId11">
+              <a:extLst>
+                <a:ext uri="{96DAC541-7B7A-43D3-8B79-37D633B846F1}">
+                  <asvg:svgBlip xmlns:asvg="http://schemas.microsoft.com/office/drawing/2016/SVG/main" r:embed="rId12"/>
+                </a:ext>
+              </a:extLst>
+            </a:blip>
+            <a:stretch>
+              <a:fillRect/>
+            </a:stretch>
+          </p:blipFill>
+          <p:spPr>
+            <a:xfrm>
+              <a:off x="26143274" y="8447051"/>
+              <a:ext cx="1393069" cy="1393069"/>
+            </a:xfrm>
+            <a:prstGeom prst="rect">
+              <a:avLst/>
+            </a:prstGeom>
+          </p:spPr>
+        </p:pic>
+        <p:pic>
+          <p:nvPicPr>
+            <p:cNvPr id="30" name="Graphic 29" descr="Coffee with solid fill">
+              <a:extLst>
+                <a:ext uri="{FF2B5EF4-FFF2-40B4-BE49-F238E27FC236}">
+                  <a16:creationId xmlns:a16="http://schemas.microsoft.com/office/drawing/2014/main" id="{BA5EFB82-FDAA-A870-A9F8-C6693EC41D7D}"/>
+                </a:ext>
+              </a:extLst>
+            </p:cNvPr>
+            <p:cNvPicPr>
+              <a:picLocks noChangeAspect="1"/>
+            </p:cNvPicPr>
+            <p:nvPr/>
+          </p:nvPicPr>
+          <p:blipFill>
+            <a:blip r:embed="rId13">
+              <a:extLst>
+                <a:ext uri="{96DAC541-7B7A-43D3-8B79-37D633B846F1}">
+                  <asvg:svgBlip xmlns:asvg="http://schemas.microsoft.com/office/drawing/2016/SVG/main" r:embed="rId14"/>
+                </a:ext>
+              </a:extLst>
+            </a:blip>
+            <a:stretch>
+              <a:fillRect/>
+            </a:stretch>
+          </p:blipFill>
+          <p:spPr>
+            <a:xfrm>
+              <a:off x="23906531" y="4620816"/>
+              <a:ext cx="1389600" cy="1389600"/>
+            </a:xfrm>
+            <a:prstGeom prst="rect">
+              <a:avLst/>
+            </a:prstGeom>
+          </p:spPr>
+        </p:pic>
+        <p:pic>
+          <p:nvPicPr>
+            <p:cNvPr id="31" name="Graphic 30" descr="High voltage with solid fill">
+              <a:extLst>
+                <a:ext uri="{FF2B5EF4-FFF2-40B4-BE49-F238E27FC236}">
+                  <a16:creationId xmlns:a16="http://schemas.microsoft.com/office/drawing/2014/main" id="{4585CD41-5684-617C-ED53-A319D872022A}"/>
+                </a:ext>
+              </a:extLst>
+            </p:cNvPr>
+            <p:cNvPicPr>
+              <a:picLocks noChangeAspect="1"/>
+            </p:cNvPicPr>
+            <p:nvPr/>
+          </p:nvPicPr>
+          <p:blipFill>
+            <a:blip r:embed="rId15">
+              <a:extLst>
+                <a:ext uri="{96DAC541-7B7A-43D3-8B79-37D633B846F1}">
+                  <asvg:svgBlip xmlns:asvg="http://schemas.microsoft.com/office/drawing/2016/SVG/main" r:embed="rId16"/>
+                </a:ext>
+              </a:extLst>
+            </a:blip>
+            <a:stretch>
+              <a:fillRect/>
+            </a:stretch>
+          </p:blipFill>
+          <p:spPr>
+            <a:xfrm>
+              <a:off x="21666320" y="4694193"/>
+              <a:ext cx="1389600" cy="1389600"/>
+            </a:xfrm>
+            <a:prstGeom prst="rect">
+              <a:avLst/>
+            </a:prstGeom>
+          </p:spPr>
+        </p:pic>
+        <p:pic>
+          <p:nvPicPr>
+            <p:cNvPr id="33" name="Graphic 32" descr="Windy with solid fill">
+              <a:extLst>
+                <a:ext uri="{FF2B5EF4-FFF2-40B4-BE49-F238E27FC236}">
+                  <a16:creationId xmlns:a16="http://schemas.microsoft.com/office/drawing/2014/main" id="{BCA4908B-EFA6-40AD-3E2C-042D47448AFA}"/>
+                </a:ext>
+              </a:extLst>
+            </p:cNvPr>
+            <p:cNvPicPr>
+              <a:picLocks noChangeAspect="1"/>
+            </p:cNvPicPr>
+            <p:nvPr/>
+          </p:nvPicPr>
+          <p:blipFill>
+            <a:blip r:embed="rId17">
+              <a:extLst>
+                <a:ext uri="{96DAC541-7B7A-43D3-8B79-37D633B846F1}">
+                  <asvg:svgBlip xmlns:asvg="http://schemas.microsoft.com/office/drawing/2016/SVG/main" r:embed="rId18"/>
+                </a:ext>
+              </a:extLst>
+            </a:blip>
+            <a:stretch>
+              <a:fillRect/>
+            </a:stretch>
+          </p:blipFill>
+          <p:spPr>
+            <a:xfrm>
+              <a:off x="26143274" y="4694191"/>
+              <a:ext cx="1389599" cy="1389599"/>
+            </a:xfrm>
+            <a:prstGeom prst="rect">
+              <a:avLst/>
+            </a:prstGeom>
+          </p:spPr>
+        </p:pic>
       </p:grpSp>
     </p:spTree>
     <p:extLst>
@@ -3966,4 +4845,319 @@
     </a:ext>
   </a:extLst>
 </a:theme>
+</file>
+
+<file path=ppt/theme/theme2.xml><?xml version="1.0" encoding="utf-8"?>
+<a:theme xmlns:a="http://schemas.openxmlformats.org/drawingml/2006/main" name="Office Theme">
+  <a:themeElements>
+    <a:clrScheme name="Office">
+      <a:dk1>
+        <a:sysClr val="windowText" lastClr="000000"/>
+      </a:dk1>
+      <a:lt1>
+        <a:sysClr val="window" lastClr="FFFFFF"/>
+      </a:lt1>
+      <a:dk2>
+        <a:srgbClr val="0E2841"/>
+      </a:dk2>
+      <a:lt2>
+        <a:srgbClr val="E8E8E8"/>
+      </a:lt2>
+      <a:accent1>
+        <a:srgbClr val="156082"/>
+      </a:accent1>
+      <a:accent2>
+        <a:srgbClr val="E97132"/>
+      </a:accent2>
+      <a:accent3>
+        <a:srgbClr val="196B24"/>
+      </a:accent3>
+      <a:accent4>
+        <a:srgbClr val="0F9ED5"/>
+      </a:accent4>
+      <a:accent5>
+        <a:srgbClr val="A02B93"/>
+      </a:accent5>
+      <a:accent6>
+        <a:srgbClr val="4EA72E"/>
+      </a:accent6>
+      <a:hlink>
+        <a:srgbClr val="467886"/>
+      </a:hlink>
+      <a:folHlink>
+        <a:srgbClr val="96607D"/>
+      </a:folHlink>
+    </a:clrScheme>
+    <a:fontScheme name="Office">
+      <a:majorFont>
+        <a:latin typeface="Aptos Display" panose="02110004020202020204"/>
+        <a:ea typeface=""/>
+        <a:cs typeface=""/>
+        <a:font script="Jpan" typeface="游ゴシック Light"/>
+        <a:font script="Hang" typeface="맑은 고딕"/>
+        <a:font script="Hans" typeface="等线 Light"/>
+        <a:font script="Hant" typeface="新細明體"/>
+        <a:font script="Arab" typeface="Times New Roman"/>
+        <a:font script="Hebr" typeface="Times New Roman"/>
+        <a:font script="Thai" typeface="Angsana New"/>
+        <a:font script="Ethi" typeface="Nyala"/>
+        <a:font script="Beng" typeface="Vrinda"/>
+        <a:font script="Gujr" typeface="Shruti"/>
+        <a:font script="Khmr" typeface="MoolBoran"/>
+        <a:font script="Knda" typeface="Tunga"/>
+        <a:font script="Guru" typeface="Raavi"/>
+        <a:font script="Cans" typeface="Euphemia"/>
+        <a:font script="Cher" typeface="Plantagenet Cherokee"/>
+        <a:font script="Yiii" typeface="Microsoft Yi Baiti"/>
+        <a:font script="Tibt" typeface="Microsoft Himalaya"/>
+        <a:font script="Thaa" typeface="MV Boli"/>
+        <a:font script="Deva" typeface="Mangal"/>
+        <a:font script="Telu" typeface="Gautami"/>
+        <a:font script="Taml" typeface="Latha"/>
+        <a:font script="Syrc" typeface="Estrangelo Edessa"/>
+        <a:font script="Orya" typeface="Kalinga"/>
+        <a:font script="Mlym" typeface="Kartika"/>
+        <a:font script="Laoo" typeface="DokChampa"/>
+        <a:font script="Sinh" typeface="Iskoola Pota"/>
+        <a:font script="Mong" typeface="Mongolian Baiti"/>
+        <a:font script="Viet" typeface="Times New Roman"/>
+        <a:font script="Uigh" typeface="Microsoft Uighur"/>
+        <a:font script="Geor" typeface="Sylfaen"/>
+        <a:font script="Armn" typeface="Arial"/>
+        <a:font script="Bugi" typeface="Leelawadee UI"/>
+        <a:font script="Bopo" typeface="Microsoft JhengHei"/>
+        <a:font script="Java" typeface="Javanese Text"/>
+        <a:font script="Lisu" typeface="Segoe UI"/>
+        <a:font script="Mymr" typeface="Myanmar Text"/>
+        <a:font script="Nkoo" typeface="Ebrima"/>
+        <a:font script="Olck" typeface="Nirmala UI"/>
+        <a:font script="Osma" typeface="Ebrima"/>
+        <a:font script="Phag" typeface="Phagspa"/>
+        <a:font script="Syrn" typeface="Estrangelo Edessa"/>
+        <a:font script="Syrj" typeface="Estrangelo Edessa"/>
+        <a:font script="Syre" typeface="Estrangelo Edessa"/>
+        <a:font script="Sora" typeface="Nirmala UI"/>
+        <a:font script="Tale" typeface="Microsoft Tai Le"/>
+        <a:font script="Talu" typeface="Microsoft New Tai Lue"/>
+        <a:font script="Tfng" typeface="Ebrima"/>
+      </a:majorFont>
+      <a:minorFont>
+        <a:latin typeface="Aptos" panose="02110004020202020204"/>
+        <a:ea typeface=""/>
+        <a:cs typeface=""/>
+        <a:font script="Jpan" typeface="游ゴシック"/>
+        <a:font script="Hang" typeface="맑은 고딕"/>
+        <a:font script="Hans" typeface="等线"/>
+        <a:font script="Hant" typeface="新細明體"/>
+        <a:font script="Arab" typeface="Arial"/>
+        <a:font script="Hebr" typeface="Arial"/>
+        <a:font script="Thai" typeface="Cordia New"/>
+        <a:font script="Ethi" typeface="Nyala"/>
+        <a:font script="Beng" typeface="Vrinda"/>
+        <a:font script="Gujr" typeface="Shruti"/>
+        <a:font script="Khmr" typeface="DaunPenh"/>
+        <a:font script="Knda" typeface="Tunga"/>
+        <a:font script="Guru" typeface="Raavi"/>
+        <a:font script="Cans" typeface="Euphemia"/>
+        <a:font script="Cher" typeface="Plantagenet Cherokee"/>
+        <a:font script="Yiii" typeface="Microsoft Yi Baiti"/>
+        <a:font script="Tibt" typeface="Microsoft Himalaya"/>
+        <a:font script="Thaa" typeface="MV Boli"/>
+        <a:font script="Deva" typeface="Mangal"/>
+        <a:font script="Telu" typeface="Gautami"/>
+        <a:font script="Taml" typeface="Latha"/>
+        <a:font script="Syrc" typeface="Estrangelo Edessa"/>
+        <a:font script="Orya" typeface="Kalinga"/>
+        <a:font script="Mlym" typeface="Kartika"/>
+        <a:font script="Laoo" typeface="DokChampa"/>
+        <a:font script="Sinh" typeface="Iskoola Pota"/>
+        <a:font script="Mong" typeface="Mongolian Baiti"/>
+        <a:font script="Viet" typeface="Arial"/>
+        <a:font script="Uigh" typeface="Microsoft Uighur"/>
+        <a:font script="Geor" typeface="Sylfaen"/>
+        <a:font script="Armn" typeface="Arial"/>
+        <a:font script="Bugi" typeface="Leelawadee UI"/>
+        <a:font script="Bopo" typeface="Microsoft JhengHei"/>
+        <a:font script="Java" typeface="Javanese Text"/>
+        <a:font script="Lisu" typeface="Segoe UI"/>
+        <a:font script="Mymr" typeface="Myanmar Text"/>
+        <a:font script="Nkoo" typeface="Ebrima"/>
+        <a:font script="Olck" typeface="Nirmala UI"/>
+        <a:font script="Osma" typeface="Ebrima"/>
+        <a:font script="Phag" typeface="Phagspa"/>
+        <a:font script="Syrn" typeface="Estrangelo Edessa"/>
+        <a:font script="Syrj" typeface="Estrangelo Edessa"/>
+        <a:font script="Syre" typeface="Estrangelo Edessa"/>
+        <a:font script="Sora" typeface="Nirmala UI"/>
+        <a:font script="Tale" typeface="Microsoft Tai Le"/>
+        <a:font script="Talu" typeface="Microsoft New Tai Lue"/>
+        <a:font script="Tfng" typeface="Ebrima"/>
+      </a:minorFont>
+    </a:fontScheme>
+    <a:fmtScheme name="Office">
+      <a:fillStyleLst>
+        <a:solidFill>
+          <a:schemeClr val="phClr"/>
+        </a:solidFill>
+        <a:gradFill rotWithShape="1">
+          <a:gsLst>
+            <a:gs pos="0">
+              <a:schemeClr val="phClr">
+                <a:lumMod val="110000"/>
+                <a:satMod val="105000"/>
+                <a:tint val="67000"/>
+              </a:schemeClr>
+            </a:gs>
+            <a:gs pos="50000">
+              <a:schemeClr val="phClr">
+                <a:lumMod val="105000"/>
+                <a:satMod val="103000"/>
+                <a:tint val="73000"/>
+              </a:schemeClr>
+            </a:gs>
+            <a:gs pos="100000">
+              <a:schemeClr val="phClr">
+                <a:lumMod val="105000"/>
+                <a:satMod val="109000"/>
+                <a:tint val="81000"/>
+              </a:schemeClr>
+            </a:gs>
+          </a:gsLst>
+          <a:lin ang="5400000" scaled="0"/>
+        </a:gradFill>
+        <a:gradFill rotWithShape="1">
+          <a:gsLst>
+            <a:gs pos="0">
+              <a:schemeClr val="phClr">
+                <a:satMod val="103000"/>
+                <a:lumMod val="102000"/>
+                <a:tint val="94000"/>
+              </a:schemeClr>
+            </a:gs>
+            <a:gs pos="50000">
+              <a:schemeClr val="phClr">
+                <a:satMod val="110000"/>
+                <a:lumMod val="100000"/>
+                <a:shade val="100000"/>
+              </a:schemeClr>
+            </a:gs>
+            <a:gs pos="100000">
+              <a:schemeClr val="phClr">
+                <a:lumMod val="99000"/>
+                <a:satMod val="120000"/>
+                <a:shade val="78000"/>
+              </a:schemeClr>
+            </a:gs>
+          </a:gsLst>
+          <a:lin ang="5400000" scaled="0"/>
+        </a:gradFill>
+      </a:fillStyleLst>
+      <a:lnStyleLst>
+        <a:ln w="12700" cap="flat" cmpd="sng" algn="ctr">
+          <a:solidFill>
+            <a:schemeClr val="phClr"/>
+          </a:solidFill>
+          <a:prstDash val="solid"/>
+          <a:miter lim="800000"/>
+        </a:ln>
+        <a:ln w="19050" cap="flat" cmpd="sng" algn="ctr">
+          <a:solidFill>
+            <a:schemeClr val="phClr"/>
+          </a:solidFill>
+          <a:prstDash val="solid"/>
+          <a:miter lim="800000"/>
+        </a:ln>
+        <a:ln w="25400" cap="flat" cmpd="sng" algn="ctr">
+          <a:solidFill>
+            <a:schemeClr val="phClr"/>
+          </a:solidFill>
+          <a:prstDash val="solid"/>
+          <a:miter lim="800000"/>
+        </a:ln>
+      </a:lnStyleLst>
+      <a:effectStyleLst>
+        <a:effectStyle>
+          <a:effectLst/>
+        </a:effectStyle>
+        <a:effectStyle>
+          <a:effectLst/>
+        </a:effectStyle>
+        <a:effectStyle>
+          <a:effectLst>
+            <a:outerShdw blurRad="57150" dist="19050" dir="5400000" algn="ctr" rotWithShape="0">
+              <a:srgbClr val="000000">
+                <a:alpha val="63000"/>
+              </a:srgbClr>
+            </a:outerShdw>
+          </a:effectLst>
+        </a:effectStyle>
+      </a:effectStyleLst>
+      <a:bgFillStyleLst>
+        <a:solidFill>
+          <a:schemeClr val="phClr"/>
+        </a:solidFill>
+        <a:solidFill>
+          <a:schemeClr val="phClr">
+            <a:tint val="95000"/>
+            <a:satMod val="170000"/>
+          </a:schemeClr>
+        </a:solidFill>
+        <a:gradFill rotWithShape="1">
+          <a:gsLst>
+            <a:gs pos="0">
+              <a:schemeClr val="phClr">
+                <a:tint val="93000"/>
+                <a:satMod val="150000"/>
+                <a:shade val="98000"/>
+                <a:lumMod val="102000"/>
+              </a:schemeClr>
+            </a:gs>
+            <a:gs pos="50000">
+              <a:schemeClr val="phClr">
+                <a:tint val="98000"/>
+                <a:satMod val="130000"/>
+                <a:shade val="90000"/>
+                <a:lumMod val="103000"/>
+              </a:schemeClr>
+            </a:gs>
+            <a:gs pos="100000">
+              <a:schemeClr val="phClr">
+                <a:shade val="63000"/>
+                <a:satMod val="120000"/>
+              </a:schemeClr>
+            </a:gs>
+          </a:gsLst>
+          <a:lin ang="5400000" scaled="0"/>
+        </a:gradFill>
+      </a:bgFillStyleLst>
+    </a:fmtScheme>
+  </a:themeElements>
+  <a:objectDefaults>
+    <a:lnDef>
+      <a:spPr/>
+      <a:bodyPr/>
+      <a:lstStyle/>
+      <a:style>
+        <a:lnRef idx="2">
+          <a:schemeClr val="accent1"/>
+        </a:lnRef>
+        <a:fillRef idx="0">
+          <a:schemeClr val="accent1"/>
+        </a:fillRef>
+        <a:effectRef idx="1">
+          <a:schemeClr val="accent1"/>
+        </a:effectRef>
+        <a:fontRef idx="minor">
+          <a:schemeClr val="tx1"/>
+        </a:fontRef>
+      </a:style>
+    </a:lnDef>
+  </a:objectDefaults>
+  <a:extraClrSchemeLst/>
+  <a:extLst>
+    <a:ext uri="{05A4C25C-085E-4340-85A3-A5531E510DB2}">
+      <thm15:themeFamily xmlns:thm15="http://schemas.microsoft.com/office/thememl/2012/main" name="Office Theme" id="{2E142A2C-CD16-42D6-873A-C26D2A0506FA}" vid="{1BDDFF52-6CD6-40A5-AB3C-68EB2F1E4D0A}"/>
+    </a:ext>
+  </a:extLst>
+</a:theme>
 </file>
</xml_diff>